<commit_message>
Updating presentation with requirements and design and process
</commit_message>
<xml_diff>
--- a/presentation/presentation.pptx
+++ b/presentation/presentation.pptx
@@ -5,7 +5,7 @@
     <p:sldMasterId id="2147483648" r:id="rId1"/>
   </p:sldMasterIdLst>
   <p:notesMasterIdLst>
-    <p:notesMasterId r:id="rId8"/>
+    <p:notesMasterId r:id="rId12"/>
   </p:notesMasterIdLst>
   <p:sldIdLst>
     <p:sldId id="256" r:id="rId2"/>
@@ -14,6 +14,10 @@
     <p:sldId id="259" r:id="rId5"/>
     <p:sldId id="264" r:id="rId6"/>
     <p:sldId id="263" r:id="rId7"/>
+    <p:sldId id="265" r:id="rId8"/>
+    <p:sldId id="266" r:id="rId9"/>
+    <p:sldId id="267" r:id="rId10"/>
+    <p:sldId id="268" r:id="rId11"/>
   </p:sldIdLst>
   <p:sldSz cx="9144000" cy="6858000" type="screen4x3"/>
   <p:notesSz cx="6858000" cy="9144000"/>
@@ -3618,6 +3622,107 @@
 </p:sld>
 </file>
 
+<file path=ppt/slides/slide10.xml><?xml version="1.0" encoding="utf-8"?>
+<p:sld xmlns:a="http://schemas.openxmlformats.org/drawingml/2006/main" xmlns:r="http://schemas.openxmlformats.org/officeDocument/2006/relationships" xmlns:p="http://schemas.openxmlformats.org/presentationml/2006/main">
+  <p:cSld>
+    <p:spTree>
+      <p:nvGrpSpPr>
+        <p:cNvPr id="1" name=""/>
+        <p:cNvGrpSpPr/>
+        <p:nvPr/>
+      </p:nvGrpSpPr>
+      <p:grpSpPr>
+        <a:xfrm>
+          <a:off x="0" y="0"/>
+          <a:ext cx="0" cy="0"/>
+          <a:chOff x="0" y="0"/>
+          <a:chExt cx="0" cy="0"/>
+        </a:xfrm>
+      </p:grpSpPr>
+      <p:sp>
+        <p:nvSpPr>
+          <p:cNvPr id="2" name="Titel 1"/>
+          <p:cNvSpPr>
+            <a:spLocks noGrp="1"/>
+          </p:cNvSpPr>
+          <p:nvPr>
+            <p:ph type="title"/>
+          </p:nvPr>
+        </p:nvSpPr>
+        <p:spPr/>
+        <p:txBody>
+          <a:bodyPr/>
+          <a:lstStyle/>
+          <a:p>
+            <a:r>
+              <a:rPr lang="da-DK" dirty="0" err="1" smtClean="0"/>
+              <a:t>Questions</a:t>
+            </a:r>
+            <a:r>
+              <a:rPr lang="da-DK" dirty="0" smtClean="0"/>
+              <a:t>?</a:t>
+            </a:r>
+            <a:endParaRPr lang="da-DK" dirty="0"/>
+          </a:p>
+        </p:txBody>
+      </p:sp>
+      <p:sp>
+        <p:nvSpPr>
+          <p:cNvPr id="4" name="Pladsholder til sidefod 3"/>
+          <p:cNvSpPr>
+            <a:spLocks noGrp="1"/>
+          </p:cNvSpPr>
+          <p:nvPr>
+            <p:ph type="ftr" sz="quarter" idx="11"/>
+          </p:nvPr>
+        </p:nvSpPr>
+        <p:spPr/>
+        <p:txBody>
+          <a:bodyPr/>
+          <a:lstStyle/>
+          <a:p>
+            <a:r>
+              <a:rPr lang="da-DK" smtClean="0"/>
+              <a:t>Company F</a:t>
+            </a:r>
+            <a:endParaRPr lang="da-DK"/>
+          </a:p>
+        </p:txBody>
+      </p:sp>
+      <p:pic>
+        <p:nvPicPr>
+          <p:cNvPr id="22530" name="Picture 2" descr="F16_3_800.jpg F 16 flares picture by John_C_R"/>
+          <p:cNvPicPr>
+            <a:picLocks noChangeAspect="1" noChangeArrowheads="1"/>
+          </p:cNvPicPr>
+          <p:nvPr/>
+        </p:nvPicPr>
+        <p:blipFill>
+          <a:blip r:embed="rId2" cstate="print"/>
+          <a:srcRect/>
+          <a:stretch>
+            <a:fillRect/>
+          </a:stretch>
+        </p:blipFill>
+        <p:spPr bwMode="auto">
+          <a:xfrm>
+            <a:off x="768424" y="1365844"/>
+            <a:ext cx="7620000" cy="4943476"/>
+          </a:xfrm>
+          <a:prstGeom prst="rect">
+            <a:avLst/>
+          </a:prstGeom>
+          <a:noFill/>
+        </p:spPr>
+      </p:pic>
+    </p:spTree>
+  </p:cSld>
+  <p:clrMapOvr>
+    <a:masterClrMapping/>
+  </p:clrMapOvr>
+</p:sld>
+</file>
+
 <file path=ppt/slides/slide2.xml><?xml version="1.0" encoding="utf-8"?>
 <p:sld xmlns:a="http://schemas.openxmlformats.org/drawingml/2006/main" xmlns:r="http://schemas.openxmlformats.org/officeDocument/2006/relationships" xmlns:p="http://schemas.openxmlformats.org/presentationml/2006/main">
   <p:cSld>
@@ -4022,61 +4127,28 @@
           <a:lstStyle/>
           <a:p>
             <a:r>
-              <a:rPr lang="da-DK" sz="3200" dirty="0" smtClean="0"/>
+              <a:rPr lang="en-US" sz="3200" dirty="0" smtClean="0"/>
               <a:t>Alternatives?</a:t>
             </a:r>
           </a:p>
           <a:p>
             <a:r>
-              <a:rPr lang="da-DK" sz="3200" dirty="0" smtClean="0"/>
-              <a:t>  - Accept the </a:t>
-            </a:r>
-            <a:r>
-              <a:rPr lang="da-DK" sz="3200" dirty="0" err="1" smtClean="0"/>
-              <a:t>risk</a:t>
-            </a:r>
-            <a:endParaRPr lang="da-DK" sz="3200" dirty="0" smtClean="0"/>
-          </a:p>
-          <a:p>
-            <a:r>
-              <a:rPr lang="da-DK" sz="3200" dirty="0" smtClean="0"/>
-              <a:t>  - </a:t>
-            </a:r>
-            <a:r>
-              <a:rPr lang="da-DK" sz="3200" dirty="0" err="1" smtClean="0"/>
-              <a:t>Avoid</a:t>
-            </a:r>
-            <a:r>
-              <a:rPr lang="da-DK" sz="3200" dirty="0" smtClean="0"/>
-              <a:t> </a:t>
-            </a:r>
-            <a:r>
-              <a:rPr lang="da-DK" sz="3200" dirty="0" err="1" smtClean="0"/>
-              <a:t>conflicts</a:t>
-            </a:r>
-            <a:endParaRPr lang="da-DK" sz="3200" dirty="0" smtClean="0"/>
-          </a:p>
-          <a:p>
-            <a:r>
-              <a:rPr lang="da-DK" sz="3200" dirty="0" smtClean="0"/>
-              <a:t>  - Company F </a:t>
-            </a:r>
-            <a:r>
-              <a:rPr lang="da-DK" sz="3200" dirty="0" err="1" smtClean="0"/>
-              <a:t>Self</a:t>
-            </a:r>
-            <a:r>
-              <a:rPr lang="da-DK" sz="3200" dirty="0" smtClean="0"/>
-              <a:t> </a:t>
-            </a:r>
-            <a:r>
-              <a:rPr lang="da-DK" sz="3200" dirty="0" err="1" smtClean="0"/>
-              <a:t>protection</a:t>
-            </a:r>
-            <a:r>
-              <a:rPr lang="da-DK" sz="3200" dirty="0" smtClean="0"/>
-              <a:t> suite for F-16</a:t>
-            </a:r>
+              <a:rPr lang="en-US" sz="3200" dirty="0" smtClean="0"/>
+              <a:t>  - Accept the risk</a:t>
+            </a:r>
+          </a:p>
+          <a:p>
+            <a:r>
+              <a:rPr lang="en-US" sz="3200" dirty="0" smtClean="0"/>
+              <a:t>  - Avoid conflicts</a:t>
+            </a:r>
+          </a:p>
+          <a:p>
+            <a:r>
+              <a:rPr lang="en-US" sz="3200" dirty="0" smtClean="0"/>
+              <a:t>  - Company F Self protection suite for F-16</a:t>
+            </a:r>
+            <a:endParaRPr lang="en-US" sz="3200" dirty="0" smtClean="0"/>
           </a:p>
         </p:txBody>
       </p:sp>
@@ -4436,19 +4508,20 @@
             <a:pPr marL="514350" indent="-514350"/>
             <a:r>
               <a:rPr lang="en-US" sz="2800" dirty="0" smtClean="0"/>
-              <a:t>The </a:t>
-            </a:r>
+              <a:t>The list price for outfitting one F-16 with the </a:t>
+            </a:r>
+          </a:p>
+          <a:p>
+            <a:pPr marL="514350" indent="-514350"/>
             <a:r>
               <a:rPr lang="en-US" sz="2800" dirty="0" smtClean="0"/>
-              <a:t>list price for outfitting one F-16 with the </a:t>
-            </a:r>
-          </a:p>
-          <a:p>
-            <a:pPr marL="514350" indent="-514350"/>
+              <a:t>Company F Self protection suite for F-16 </a:t>
+            </a:r>
             <a:r>
               <a:rPr lang="en-US" sz="2800" dirty="0" smtClean="0"/>
-              <a:t>Company F Self protection suite for F-16 is </a:t>
-            </a:r>
+              <a:t>is:</a:t>
+            </a:r>
+            <a:endParaRPr lang="en-US" sz="2800" dirty="0" smtClean="0"/>
           </a:p>
           <a:p>
             <a:pPr marL="514350" indent="-514350"/>
@@ -4461,11 +4534,7 @@
             <a:pPr marL="514350" indent="-514350"/>
             <a:r>
               <a:rPr lang="en-US" sz="2800" dirty="0" smtClean="0"/>
-              <a:t> </a:t>
-            </a:r>
-            <a:r>
-              <a:rPr lang="en-US" sz="2800" dirty="0" smtClean="0"/>
-              <a:t>  1 Cockpit unit: 500,000.-</a:t>
+              <a:t>   1 Cockpit unit: 500,000.-</a:t>
             </a:r>
           </a:p>
           <a:p>
@@ -4479,7 +4548,23 @@
             <a:pPr marL="514350" indent="-514350"/>
             <a:r>
               <a:rPr lang="en-US" sz="2800" dirty="0" smtClean="0"/>
-              <a:t>1/3 of the price of one F-16 without pilot.</a:t>
+              <a:t>1/3 </a:t>
+            </a:r>
+            <a:r>
+              <a:rPr lang="en-US" sz="2800" dirty="0" smtClean="0"/>
+              <a:t>the </a:t>
+            </a:r>
+            <a:r>
+              <a:rPr lang="en-US" sz="2800" dirty="0" smtClean="0"/>
+              <a:t>price of one </a:t>
+            </a:r>
+            <a:r>
+              <a:rPr lang="en-US" sz="2800" dirty="0" smtClean="0"/>
+              <a:t>F-16 without a pilot</a:t>
+            </a:r>
+            <a:r>
+              <a:rPr lang="en-US" sz="2800" dirty="0" smtClean="0"/>
+              <a:t>.</a:t>
             </a:r>
           </a:p>
         </p:txBody>
@@ -4492,8 +4577,8 @@
         </p:nvSpPr>
         <p:spPr>
           <a:xfrm>
-            <a:off x="1547664" y="5229200"/>
-            <a:ext cx="5827686" cy="769441"/>
+            <a:off x="1475656" y="5229200"/>
+            <a:ext cx="6151107" cy="769441"/>
           </a:xfrm>
           <a:prstGeom prst="rect">
             <a:avLst/>
@@ -4506,44 +4591,16 @@
           <a:lstStyle/>
           <a:p>
             <a:r>
+              <a:rPr lang="da-DK" sz="4400" dirty="0" smtClean="0"/>
+              <a:t>It saves </a:t>
+            </a:r>
+            <a:r>
               <a:rPr lang="da-DK" sz="4400" dirty="0" err="1" smtClean="0"/>
-              <a:t>Can</a:t>
+              <a:t>money</a:t>
             </a:r>
             <a:r>
               <a:rPr lang="da-DK" sz="4400" dirty="0" smtClean="0"/>
-              <a:t> </a:t>
-            </a:r>
-            <a:r>
-              <a:rPr lang="da-DK" sz="4400" dirty="0" err="1" smtClean="0"/>
-              <a:t>there</a:t>
-            </a:r>
-            <a:r>
-              <a:rPr lang="da-DK" sz="4400" dirty="0" smtClean="0"/>
-              <a:t> </a:t>
-            </a:r>
-            <a:r>
-              <a:rPr lang="da-DK" sz="4400" dirty="0" err="1" smtClean="0"/>
-              <a:t>be</a:t>
-            </a:r>
-            <a:r>
-              <a:rPr lang="da-DK" sz="4400" dirty="0" smtClean="0"/>
-              <a:t> </a:t>
-            </a:r>
-            <a:r>
-              <a:rPr lang="da-DK" sz="4400" dirty="0" err="1" smtClean="0"/>
-              <a:t>any</a:t>
-            </a:r>
-            <a:r>
-              <a:rPr lang="da-DK" sz="4400" dirty="0" smtClean="0"/>
-              <a:t> </a:t>
-            </a:r>
-            <a:r>
-              <a:rPr lang="da-DK" sz="4400" dirty="0" err="1" smtClean="0"/>
-              <a:t>doubt</a:t>
-            </a:r>
-            <a:r>
-              <a:rPr lang="da-DK" sz="4400" dirty="0" smtClean="0"/>
-              <a:t>?</a:t>
+              <a:t> AND lives!</a:t>
             </a:r>
             <a:endParaRPr lang="da-DK" sz="4400" dirty="0"/>
           </a:p>
@@ -4591,6 +4648,249 @@
           <a:p>
             <a:r>
               <a:rPr lang="da-DK" dirty="0" smtClean="0"/>
+              <a:t>The </a:t>
+            </a:r>
+            <a:r>
+              <a:rPr lang="da-DK" dirty="0" err="1" smtClean="0"/>
+              <a:t>requirements</a:t>
+            </a:r>
+            <a:endParaRPr lang="da-DK" dirty="0"/>
+          </a:p>
+        </p:txBody>
+      </p:sp>
+      <p:sp>
+        <p:nvSpPr>
+          <p:cNvPr id="3" name="Pladsholder til indhold 2"/>
+          <p:cNvSpPr>
+            <a:spLocks noGrp="1"/>
+          </p:cNvSpPr>
+          <p:nvPr>
+            <p:ph idx="1"/>
+          </p:nvPr>
+        </p:nvSpPr>
+        <p:spPr>
+          <a:xfrm>
+            <a:off x="467544" y="1412776"/>
+            <a:ext cx="8229600" cy="4525963"/>
+          </a:xfrm>
+        </p:spPr>
+        <p:txBody>
+          <a:bodyPr>
+            <a:normAutofit fontScale="92500" lnSpcReduction="10000"/>
+          </a:bodyPr>
+          <a:lstStyle/>
+          <a:p>
+            <a:r>
+              <a:rPr lang="da-DK" dirty="0" smtClean="0"/>
+              <a:t>Optimal </a:t>
+            </a:r>
+            <a:r>
+              <a:rPr lang="da-DK" dirty="0" err="1" smtClean="0"/>
+              <a:t>coverage</a:t>
+            </a:r>
+            <a:endParaRPr lang="da-DK" dirty="0" smtClean="0"/>
+          </a:p>
+          <a:p>
+            <a:r>
+              <a:rPr lang="da-DK" dirty="0" smtClean="0"/>
+              <a:t>Do not interferer </a:t>
+            </a:r>
+            <a:r>
+              <a:rPr lang="da-DK" dirty="0" err="1" smtClean="0"/>
+              <a:t>with</a:t>
+            </a:r>
+            <a:r>
+              <a:rPr lang="da-DK" dirty="0" smtClean="0"/>
+              <a:t> </a:t>
+            </a:r>
+            <a:r>
+              <a:rPr lang="da-DK" dirty="0" err="1" smtClean="0"/>
+              <a:t>existing</a:t>
+            </a:r>
+            <a:r>
+              <a:rPr lang="da-DK" dirty="0" smtClean="0"/>
+              <a:t> systemet (</a:t>
+            </a:r>
+            <a:r>
+              <a:rPr lang="da-DK" dirty="0" err="1" smtClean="0"/>
+              <a:t>subcontractor</a:t>
+            </a:r>
+            <a:r>
+              <a:rPr lang="da-DK" dirty="0" smtClean="0"/>
+              <a:t>)</a:t>
+            </a:r>
+          </a:p>
+          <a:p>
+            <a:r>
+              <a:rPr lang="da-DK" dirty="0" err="1" smtClean="0"/>
+              <a:t>Use</a:t>
+            </a:r>
+            <a:r>
+              <a:rPr lang="da-DK" dirty="0" smtClean="0"/>
+              <a:t> GFE</a:t>
+            </a:r>
+          </a:p>
+          <a:p>
+            <a:r>
+              <a:rPr lang="da-DK" dirty="0" smtClean="0"/>
+              <a:t>PCU </a:t>
+            </a:r>
+            <a:r>
+              <a:rPr lang="da-DK" dirty="0" err="1" smtClean="0"/>
+              <a:t>available</a:t>
+            </a:r>
+            <a:endParaRPr lang="da-DK" dirty="0" smtClean="0"/>
+          </a:p>
+          <a:p>
+            <a:r>
+              <a:rPr lang="da-DK" dirty="0" err="1" smtClean="0"/>
+              <a:t>Ground</a:t>
+            </a:r>
+            <a:r>
+              <a:rPr lang="da-DK" dirty="0" smtClean="0"/>
+              <a:t> </a:t>
+            </a:r>
+            <a:r>
+              <a:rPr lang="da-DK" dirty="0" err="1" smtClean="0"/>
+              <a:t>dispense</a:t>
+            </a:r>
+            <a:r>
+              <a:rPr lang="da-DK" dirty="0" smtClean="0"/>
+              <a:t> </a:t>
+            </a:r>
+            <a:r>
+              <a:rPr lang="da-DK" dirty="0" err="1" smtClean="0"/>
+              <a:t>protection</a:t>
+            </a:r>
+            <a:endParaRPr lang="da-DK" dirty="0" smtClean="0"/>
+          </a:p>
+          <a:p>
+            <a:r>
+              <a:rPr lang="da-DK" dirty="0" err="1" smtClean="0"/>
+              <a:t>Customer</a:t>
+            </a:r>
+            <a:r>
+              <a:rPr lang="da-DK" dirty="0" smtClean="0"/>
+              <a:t> feedback</a:t>
+            </a:r>
+          </a:p>
+          <a:p>
+            <a:r>
+              <a:rPr lang="da-DK" dirty="0" err="1" smtClean="0"/>
+              <a:t>High</a:t>
+            </a:r>
+            <a:r>
+              <a:rPr lang="da-DK" dirty="0" smtClean="0"/>
+              <a:t> </a:t>
+            </a:r>
+            <a:r>
+              <a:rPr lang="da-DK" dirty="0" err="1" smtClean="0"/>
+              <a:t>detail</a:t>
+            </a:r>
+            <a:r>
+              <a:rPr lang="da-DK" dirty="0" smtClean="0"/>
+              <a:t> </a:t>
+            </a:r>
+            <a:r>
+              <a:rPr lang="da-DK" dirty="0" err="1" smtClean="0"/>
+              <a:t>level</a:t>
+            </a:r>
+            <a:r>
+              <a:rPr lang="da-DK" dirty="0" smtClean="0"/>
+              <a:t> in system </a:t>
+            </a:r>
+            <a:r>
+              <a:rPr lang="da-DK" dirty="0" err="1" smtClean="0"/>
+              <a:t>requirements</a:t>
+            </a:r>
+            <a:r>
+              <a:rPr lang="da-DK" dirty="0" smtClean="0"/>
+              <a:t> (missile </a:t>
+            </a:r>
+            <a:r>
+              <a:rPr lang="da-DK" dirty="0" err="1" smtClean="0"/>
+              <a:t>coverage</a:t>
+            </a:r>
+            <a:r>
+              <a:rPr lang="da-DK" dirty="0" smtClean="0"/>
+              <a:t>, power and </a:t>
+            </a:r>
+            <a:r>
+              <a:rPr lang="da-DK" dirty="0" err="1" smtClean="0"/>
+              <a:t>weight</a:t>
+            </a:r>
+            <a:r>
+              <a:rPr lang="da-DK" dirty="0" smtClean="0"/>
+              <a:t>, pin layout, …)</a:t>
+            </a:r>
+          </a:p>
+        </p:txBody>
+      </p:sp>
+      <p:sp>
+        <p:nvSpPr>
+          <p:cNvPr id="4" name="Pladsholder til sidefod 3"/>
+          <p:cNvSpPr>
+            <a:spLocks noGrp="1"/>
+          </p:cNvSpPr>
+          <p:nvPr>
+            <p:ph type="ftr" sz="quarter" idx="11"/>
+          </p:nvPr>
+        </p:nvSpPr>
+        <p:spPr/>
+        <p:txBody>
+          <a:bodyPr/>
+          <a:lstStyle/>
+          <a:p>
+            <a:r>
+              <a:rPr lang="da-DK" smtClean="0"/>
+              <a:t>Company F</a:t>
+            </a:r>
+            <a:endParaRPr lang="da-DK"/>
+          </a:p>
+        </p:txBody>
+      </p:sp>
+    </p:spTree>
+  </p:cSld>
+  <p:clrMapOvr>
+    <a:masterClrMapping/>
+  </p:clrMapOvr>
+</p:sld>
+</file>
+
+<file path=ppt/slides/slide7.xml><?xml version="1.0" encoding="utf-8"?>
+<p:sld xmlns:a="http://schemas.openxmlformats.org/drawingml/2006/main" xmlns:r="http://schemas.openxmlformats.org/officeDocument/2006/relationships" xmlns:p="http://schemas.openxmlformats.org/presentationml/2006/main">
+  <p:cSld>
+    <p:spTree>
+      <p:nvGrpSpPr>
+        <p:cNvPr id="1" name=""/>
+        <p:cNvGrpSpPr/>
+        <p:nvPr/>
+      </p:nvGrpSpPr>
+      <p:grpSpPr>
+        <a:xfrm>
+          <a:off x="0" y="0"/>
+          <a:ext cx="0" cy="0"/>
+          <a:chOff x="0" y="0"/>
+          <a:chExt cx="0" cy="0"/>
+        </a:xfrm>
+      </p:grpSpPr>
+      <p:sp>
+        <p:nvSpPr>
+          <p:cNvPr id="2" name="Titel 1"/>
+          <p:cNvSpPr>
+            <a:spLocks noGrp="1"/>
+          </p:cNvSpPr>
+          <p:nvPr>
+            <p:ph type="title"/>
+          </p:nvPr>
+        </p:nvSpPr>
+        <p:spPr/>
+        <p:txBody>
+          <a:bodyPr/>
+          <a:lstStyle/>
+          <a:p>
+            <a:r>
+              <a:rPr lang="da-DK" dirty="0" smtClean="0"/>
               <a:t>The design</a:t>
             </a:r>
             <a:endParaRPr lang="da-DK" dirty="0"/>
@@ -4612,7 +4912,619 @@
           <a:bodyPr/>
           <a:lstStyle/>
           <a:p>
+            <a:r>
+              <a:rPr lang="da-DK" dirty="0" err="1" smtClean="0"/>
+              <a:t>Simplify</a:t>
+            </a:r>
+            <a:r>
+              <a:rPr lang="da-DK" dirty="0" smtClean="0"/>
+              <a:t>, </a:t>
+            </a:r>
+            <a:r>
+              <a:rPr lang="da-DK" dirty="0" err="1" smtClean="0"/>
+              <a:t>simplify</a:t>
+            </a:r>
+            <a:r>
+              <a:rPr lang="da-DK" dirty="0" smtClean="0"/>
+              <a:t>, </a:t>
+            </a:r>
+            <a:r>
+              <a:rPr lang="da-DK" dirty="0" err="1" smtClean="0"/>
+              <a:t>simplify</a:t>
+            </a:r>
+            <a:r>
+              <a:rPr lang="da-DK" dirty="0" smtClean="0"/>
+              <a:t> </a:t>
+            </a:r>
+            <a:r>
+              <a:rPr lang="da-DK" dirty="0" smtClean="0"/>
+              <a:t>(DSS fire, PCU)</a:t>
+            </a:r>
+          </a:p>
+          <a:p>
+            <a:pPr lvl="1"/>
+            <a:r>
+              <a:rPr lang="da-DK" dirty="0" err="1" smtClean="0"/>
+              <a:t>Lower</a:t>
+            </a:r>
+            <a:r>
+              <a:rPr lang="da-DK" dirty="0" smtClean="0"/>
+              <a:t> </a:t>
+            </a:r>
+            <a:r>
+              <a:rPr lang="da-DK" dirty="0" err="1" smtClean="0"/>
+              <a:t>risk</a:t>
+            </a:r>
+            <a:r>
+              <a:rPr lang="da-DK" dirty="0" smtClean="0"/>
+              <a:t>, faster, </a:t>
+            </a:r>
+            <a:r>
+              <a:rPr lang="da-DK" dirty="0" err="1" smtClean="0"/>
+              <a:t>replacable</a:t>
+            </a:r>
+            <a:r>
+              <a:rPr lang="da-DK" dirty="0" smtClean="0"/>
+              <a:t>, </a:t>
+            </a:r>
+            <a:r>
+              <a:rPr lang="da-DK" dirty="0" err="1" smtClean="0"/>
+              <a:t>reliable</a:t>
+            </a:r>
+            <a:endParaRPr lang="da-DK" dirty="0" smtClean="0"/>
+          </a:p>
+          <a:p>
+            <a:r>
+              <a:rPr lang="da-DK" dirty="0" smtClean="0"/>
+              <a:t>HW </a:t>
+            </a:r>
+            <a:r>
+              <a:rPr lang="da-DK" dirty="0" err="1" smtClean="0"/>
+              <a:t>safety</a:t>
+            </a:r>
+            <a:r>
+              <a:rPr lang="da-DK" dirty="0" smtClean="0"/>
+              <a:t> </a:t>
+            </a:r>
+            <a:r>
+              <a:rPr lang="da-DK" dirty="0" err="1" smtClean="0"/>
+              <a:t>with</a:t>
+            </a:r>
+            <a:r>
+              <a:rPr lang="da-DK" dirty="0" smtClean="0"/>
+              <a:t> </a:t>
+            </a:r>
+            <a:r>
+              <a:rPr lang="da-DK" dirty="0" err="1" smtClean="0"/>
+              <a:t>physically</a:t>
+            </a:r>
+            <a:r>
+              <a:rPr lang="da-DK" dirty="0" smtClean="0"/>
+              <a:t> </a:t>
+            </a:r>
+            <a:r>
+              <a:rPr lang="da-DK" dirty="0" err="1" smtClean="0"/>
+              <a:t>removable</a:t>
+            </a:r>
+            <a:r>
+              <a:rPr lang="da-DK" dirty="0" smtClean="0"/>
+              <a:t> pin</a:t>
+            </a:r>
+          </a:p>
+          <a:p>
+            <a:r>
+              <a:rPr lang="da-DK" dirty="0" err="1" smtClean="0"/>
+              <a:t>Experienced</a:t>
+            </a:r>
+            <a:r>
+              <a:rPr lang="da-DK" dirty="0" smtClean="0"/>
+              <a:t> </a:t>
+            </a:r>
+            <a:r>
+              <a:rPr lang="da-DK" dirty="0" err="1" smtClean="0"/>
+              <a:t>subcontractor</a:t>
+            </a:r>
+            <a:r>
+              <a:rPr lang="da-DK" dirty="0" smtClean="0"/>
+              <a:t> </a:t>
+            </a:r>
+            <a:r>
+              <a:rPr lang="da-DK" dirty="0" err="1" smtClean="0"/>
+              <a:t>with</a:t>
+            </a:r>
+            <a:r>
+              <a:rPr lang="da-DK" dirty="0" smtClean="0"/>
+              <a:t> clear </a:t>
+            </a:r>
+            <a:r>
+              <a:rPr lang="da-DK" dirty="0" err="1" smtClean="0"/>
+              <a:t>requirements</a:t>
+            </a:r>
+            <a:r>
+              <a:rPr lang="da-DK" dirty="0" smtClean="0"/>
+              <a:t> (standards)</a:t>
+            </a:r>
+          </a:p>
+          <a:p>
+            <a:r>
+              <a:rPr lang="da-DK" dirty="0" smtClean="0"/>
+              <a:t>Cold </a:t>
+            </a:r>
+            <a:r>
+              <a:rPr lang="da-DK" dirty="0" err="1" smtClean="0"/>
+              <a:t>restart</a:t>
+            </a:r>
+            <a:r>
+              <a:rPr lang="da-DK" dirty="0" smtClean="0"/>
+              <a:t> power </a:t>
+            </a:r>
+            <a:r>
+              <a:rPr lang="da-DK" dirty="0" err="1" smtClean="0"/>
+              <a:t>control</a:t>
+            </a:r>
+            <a:endParaRPr lang="da-DK" dirty="0" smtClean="0"/>
+          </a:p>
+          <a:p>
+            <a:r>
+              <a:rPr lang="da-DK" dirty="0" err="1" smtClean="0"/>
+              <a:t>Use</a:t>
+            </a:r>
+            <a:r>
+              <a:rPr lang="da-DK" dirty="0" smtClean="0"/>
+              <a:t> standards </a:t>
+            </a:r>
+            <a:r>
+              <a:rPr lang="da-DK" dirty="0" err="1" smtClean="0"/>
+              <a:t>where</a:t>
+            </a:r>
+            <a:r>
+              <a:rPr lang="da-DK" dirty="0" smtClean="0"/>
+              <a:t> </a:t>
+            </a:r>
+            <a:r>
+              <a:rPr lang="da-DK" dirty="0" err="1" smtClean="0"/>
+              <a:t>available</a:t>
+            </a:r>
+            <a:endParaRPr lang="da-DK" dirty="0" smtClean="0"/>
+          </a:p>
+          <a:p>
+            <a:r>
+              <a:rPr lang="da-DK" dirty="0" err="1" smtClean="0"/>
+              <a:t>SysML</a:t>
+            </a:r>
+            <a:endParaRPr lang="da-DK" dirty="0" smtClean="0"/>
+          </a:p>
+        </p:txBody>
+      </p:sp>
+      <p:sp>
+        <p:nvSpPr>
+          <p:cNvPr id="4" name="Pladsholder til sidefod 3"/>
+          <p:cNvSpPr>
+            <a:spLocks noGrp="1"/>
+          </p:cNvSpPr>
+          <p:nvPr>
+            <p:ph type="ftr" sz="quarter" idx="11"/>
+          </p:nvPr>
+        </p:nvSpPr>
+        <p:spPr/>
+        <p:txBody>
+          <a:bodyPr/>
+          <a:lstStyle/>
+          <a:p>
+            <a:r>
+              <a:rPr lang="da-DK" smtClean="0"/>
+              <a:t>Company F</a:t>
+            </a:r>
+            <a:endParaRPr lang="da-DK"/>
+          </a:p>
+        </p:txBody>
+      </p:sp>
+    </p:spTree>
+  </p:cSld>
+  <p:clrMapOvr>
+    <a:masterClrMapping/>
+  </p:clrMapOvr>
+</p:sld>
+</file>
+
+<file path=ppt/slides/slide8.xml><?xml version="1.0" encoding="utf-8"?>
+<p:sld xmlns:a="http://schemas.openxmlformats.org/drawingml/2006/main" xmlns:r="http://schemas.openxmlformats.org/officeDocument/2006/relationships" xmlns:p="http://schemas.openxmlformats.org/presentationml/2006/main">
+  <p:cSld>
+    <p:spTree>
+      <p:nvGrpSpPr>
+        <p:cNvPr id="1" name=""/>
+        <p:cNvGrpSpPr/>
+        <p:nvPr/>
+      </p:nvGrpSpPr>
+      <p:grpSpPr>
+        <a:xfrm>
+          <a:off x="0" y="0"/>
+          <a:ext cx="0" cy="0"/>
+          <a:chOff x="0" y="0"/>
+          <a:chExt cx="0" cy="0"/>
+        </a:xfrm>
+      </p:grpSpPr>
+      <p:sp>
+        <p:nvSpPr>
+          <p:cNvPr id="4" name="Pladsholder til sidefod 3"/>
+          <p:cNvSpPr>
+            <a:spLocks noGrp="1"/>
+          </p:cNvSpPr>
+          <p:nvPr>
+            <p:ph type="ftr" sz="quarter" idx="11"/>
+          </p:nvPr>
+        </p:nvSpPr>
+        <p:spPr/>
+        <p:txBody>
+          <a:bodyPr/>
+          <a:lstStyle/>
+          <a:p>
+            <a:r>
+              <a:rPr lang="da-DK" smtClean="0"/>
+              <a:t>Company F</a:t>
+            </a:r>
+            <a:endParaRPr lang="da-DK"/>
+          </a:p>
+        </p:txBody>
+      </p:sp>
+      <p:sp>
+        <p:nvSpPr>
+          <p:cNvPr id="1026" name="Rectangle 2"/>
+          <p:cNvSpPr>
+            <a:spLocks noChangeArrowheads="1"/>
+          </p:cNvSpPr>
+          <p:nvPr/>
+        </p:nvSpPr>
+        <p:spPr bwMode="auto">
+          <a:xfrm>
+            <a:off x="0" y="0"/>
+            <a:ext cx="9144000" cy="0"/>
+          </a:xfrm>
+          <a:prstGeom prst="rect">
+            <a:avLst/>
+          </a:prstGeom>
+          <a:noFill/>
+          <a:ln w="9525">
+            <a:noFill/>
+            <a:miter lim="800000"/>
+            <a:headEnd/>
+            <a:tailEnd/>
+          </a:ln>
+          <a:effectLst/>
+        </p:spPr>
+        <p:txBody>
+          <a:bodyPr vert="horz" wrap="none" lIns="91440" tIns="45720" rIns="91440" bIns="45720" numCol="1" anchor="ctr" anchorCtr="0" compatLnSpc="1">
+            <a:prstTxWarp prst="textNoShape">
+              <a:avLst/>
+            </a:prstTxWarp>
+            <a:spAutoFit/>
+          </a:bodyPr>
+          <a:lstStyle/>
+          <a:p>
+            <a:endParaRPr lang="da-DK"/>
+          </a:p>
+        </p:txBody>
+      </p:sp>
+      <p:pic>
+        <p:nvPicPr>
+          <p:cNvPr id="1027" name="Picture 3"/>
+          <p:cNvPicPr>
+            <a:picLocks noChangeAspect="1" noChangeArrowheads="1"/>
+          </p:cNvPicPr>
+          <p:nvPr/>
+        </p:nvPicPr>
+        <p:blipFill>
+          <a:blip r:embed="rId2" cstate="print"/>
+          <a:srcRect/>
+          <a:stretch>
+            <a:fillRect/>
+          </a:stretch>
+        </p:blipFill>
+        <p:spPr bwMode="auto">
+          <a:xfrm>
+            <a:off x="1187624" y="0"/>
+            <a:ext cx="6158579" cy="6854285"/>
+          </a:xfrm>
+          <a:prstGeom prst="rect">
+            <a:avLst/>
+          </a:prstGeom>
+          <a:noFill/>
+          <a:ln w="9525">
+            <a:noFill/>
+            <a:miter lim="800000"/>
+            <a:headEnd/>
+            <a:tailEnd/>
+          </a:ln>
+        </p:spPr>
+      </p:pic>
+    </p:spTree>
+  </p:cSld>
+  <p:clrMapOvr>
+    <a:masterClrMapping/>
+  </p:clrMapOvr>
+</p:sld>
+</file>
+
+<file path=ppt/slides/slide9.xml><?xml version="1.0" encoding="utf-8"?>
+<p:sld xmlns:a="http://schemas.openxmlformats.org/drawingml/2006/main" xmlns:r="http://schemas.openxmlformats.org/officeDocument/2006/relationships" xmlns:p="http://schemas.openxmlformats.org/presentationml/2006/main">
+  <p:cSld>
+    <p:spTree>
+      <p:nvGrpSpPr>
+        <p:cNvPr id="1" name=""/>
+        <p:cNvGrpSpPr/>
+        <p:nvPr/>
+      </p:nvGrpSpPr>
+      <p:grpSpPr>
+        <a:xfrm>
+          <a:off x="0" y="0"/>
+          <a:ext cx="0" cy="0"/>
+          <a:chOff x="0" y="0"/>
+          <a:chExt cx="0" cy="0"/>
+        </a:xfrm>
+      </p:grpSpPr>
+      <p:sp>
+        <p:nvSpPr>
+          <p:cNvPr id="2" name="Titel 1"/>
+          <p:cNvSpPr>
+            <a:spLocks noGrp="1"/>
+          </p:cNvSpPr>
+          <p:nvPr>
+            <p:ph type="title"/>
+          </p:nvPr>
+        </p:nvSpPr>
+        <p:spPr/>
+        <p:txBody>
+          <a:bodyPr/>
+          <a:lstStyle/>
+          <a:p>
+            <a:r>
+              <a:rPr lang="da-DK" dirty="0" smtClean="0"/>
+              <a:t>The </a:t>
+            </a:r>
+            <a:r>
+              <a:rPr lang="da-DK" dirty="0" err="1" smtClean="0"/>
+              <a:t>process</a:t>
+            </a:r>
             <a:endParaRPr lang="da-DK" dirty="0"/>
+          </a:p>
+        </p:txBody>
+      </p:sp>
+      <p:sp>
+        <p:nvSpPr>
+          <p:cNvPr id="3" name="Pladsholder til indhold 2"/>
+          <p:cNvSpPr>
+            <a:spLocks noGrp="1"/>
+          </p:cNvSpPr>
+          <p:nvPr>
+            <p:ph idx="1"/>
+          </p:nvPr>
+        </p:nvSpPr>
+        <p:spPr/>
+        <p:txBody>
+          <a:bodyPr/>
+          <a:lstStyle/>
+          <a:p>
+            <a:r>
+              <a:rPr lang="da-DK" dirty="0" err="1" smtClean="0"/>
+              <a:t>We</a:t>
+            </a:r>
+            <a:r>
+              <a:rPr lang="da-DK" dirty="0" smtClean="0"/>
+              <a:t> at Company F </a:t>
+            </a:r>
+            <a:r>
+              <a:rPr lang="da-DK" dirty="0" err="1" smtClean="0"/>
+              <a:t>believes</a:t>
+            </a:r>
+            <a:r>
+              <a:rPr lang="da-DK" dirty="0" smtClean="0"/>
+              <a:t> in </a:t>
+            </a:r>
+            <a:r>
+              <a:rPr lang="da-DK" dirty="0" err="1" smtClean="0"/>
+              <a:t>employing</a:t>
+            </a:r>
+            <a:r>
+              <a:rPr lang="da-DK" dirty="0" smtClean="0"/>
+              <a:t> the </a:t>
+            </a:r>
+            <a:r>
+              <a:rPr lang="da-DK" dirty="0" err="1" smtClean="0"/>
+              <a:t>best</a:t>
+            </a:r>
+            <a:r>
+              <a:rPr lang="da-DK" dirty="0" smtClean="0"/>
+              <a:t>, and </a:t>
+            </a:r>
+            <a:r>
+              <a:rPr lang="da-DK" dirty="0" err="1" smtClean="0"/>
+              <a:t>when</a:t>
+            </a:r>
+            <a:r>
+              <a:rPr lang="da-DK" dirty="0" smtClean="0"/>
+              <a:t> the </a:t>
+            </a:r>
+            <a:r>
+              <a:rPr lang="da-DK" dirty="0" err="1" smtClean="0"/>
+              <a:t>best</a:t>
+            </a:r>
+            <a:r>
+              <a:rPr lang="da-DK" dirty="0" smtClean="0"/>
+              <a:t> </a:t>
+            </a:r>
+            <a:r>
+              <a:rPr lang="da-DK" dirty="0" err="1" smtClean="0"/>
+              <a:t>won’t</a:t>
+            </a:r>
+            <a:r>
+              <a:rPr lang="da-DK" dirty="0" smtClean="0"/>
+              <a:t> </a:t>
+            </a:r>
+            <a:r>
+              <a:rPr lang="da-DK" dirty="0" err="1" smtClean="0"/>
+              <a:t>come</a:t>
+            </a:r>
+            <a:r>
+              <a:rPr lang="da-DK" dirty="0" smtClean="0"/>
+              <a:t> to </a:t>
+            </a:r>
+            <a:r>
+              <a:rPr lang="da-DK" dirty="0" err="1" smtClean="0"/>
+              <a:t>you</a:t>
+            </a:r>
+            <a:r>
+              <a:rPr lang="da-DK" dirty="0" smtClean="0"/>
+              <a:t>, </a:t>
+            </a:r>
+            <a:r>
+              <a:rPr lang="da-DK" dirty="0" err="1" smtClean="0"/>
+              <a:t>you</a:t>
+            </a:r>
+            <a:r>
+              <a:rPr lang="da-DK" dirty="0" smtClean="0"/>
+              <a:t> must </a:t>
+            </a:r>
+            <a:r>
+              <a:rPr lang="da-DK" dirty="0" err="1" smtClean="0"/>
+              <a:t>come</a:t>
+            </a:r>
+            <a:r>
+              <a:rPr lang="da-DK" dirty="0" smtClean="0"/>
+              <a:t> to the </a:t>
+            </a:r>
+            <a:r>
+              <a:rPr lang="da-DK" dirty="0" err="1" smtClean="0"/>
+              <a:t>best</a:t>
+            </a:r>
+            <a:r>
+              <a:rPr lang="da-DK" dirty="0" smtClean="0"/>
+              <a:t>.</a:t>
+            </a:r>
+          </a:p>
+          <a:p>
+            <a:pPr lvl="1"/>
+            <a:r>
+              <a:rPr lang="da-DK" dirty="0" err="1" smtClean="0"/>
+              <a:t>Geographically</a:t>
+            </a:r>
+            <a:r>
+              <a:rPr lang="da-DK" dirty="0" smtClean="0"/>
+              <a:t> </a:t>
+            </a:r>
+            <a:r>
+              <a:rPr lang="da-DK" dirty="0" err="1" smtClean="0"/>
+              <a:t>distributed</a:t>
+            </a:r>
+            <a:r>
+              <a:rPr lang="da-DK" dirty="0" smtClean="0"/>
+              <a:t> </a:t>
+            </a:r>
+            <a:r>
+              <a:rPr lang="da-DK" dirty="0" err="1" smtClean="0"/>
+              <a:t>developement</a:t>
+            </a:r>
+            <a:r>
+              <a:rPr lang="da-DK" dirty="0" smtClean="0"/>
+              <a:t>.</a:t>
+            </a:r>
+          </a:p>
+          <a:p>
+            <a:pPr lvl="1"/>
+            <a:r>
+              <a:rPr lang="da-DK" dirty="0" err="1" smtClean="0"/>
+              <a:t>Google</a:t>
+            </a:r>
+            <a:r>
+              <a:rPr lang="da-DK" dirty="0" smtClean="0"/>
+              <a:t> </a:t>
+            </a:r>
+            <a:r>
+              <a:rPr lang="da-DK" dirty="0" err="1" smtClean="0"/>
+              <a:t>code</a:t>
+            </a:r>
+            <a:r>
+              <a:rPr lang="da-DK" dirty="0" smtClean="0"/>
+              <a:t>, </a:t>
+            </a:r>
+            <a:r>
+              <a:rPr lang="da-DK" dirty="0" err="1" smtClean="0"/>
+              <a:t>Wiki</a:t>
+            </a:r>
+            <a:r>
+              <a:rPr lang="da-DK" dirty="0" smtClean="0"/>
+              <a:t>, </a:t>
+            </a:r>
+            <a:r>
+              <a:rPr lang="da-DK" dirty="0" err="1" smtClean="0"/>
+              <a:t>Subversion</a:t>
+            </a:r>
+            <a:r>
+              <a:rPr lang="da-DK" dirty="0" smtClean="0"/>
+              <a:t>, meetings and </a:t>
+            </a:r>
+            <a:r>
+              <a:rPr lang="da-DK" dirty="0" err="1" smtClean="0"/>
+              <a:t>late</a:t>
+            </a:r>
+            <a:r>
+              <a:rPr lang="da-DK" dirty="0" smtClean="0"/>
+              <a:t> </a:t>
+            </a:r>
+            <a:r>
+              <a:rPr lang="da-DK" dirty="0" err="1" smtClean="0"/>
+              <a:t>nights</a:t>
+            </a:r>
+            <a:r>
+              <a:rPr lang="da-DK" dirty="0" smtClean="0"/>
+              <a:t>.</a:t>
+            </a:r>
+          </a:p>
+          <a:p>
+            <a:pPr lvl="1"/>
+            <a:r>
+              <a:rPr lang="da-DK" dirty="0" err="1" smtClean="0"/>
+              <a:t>Internal</a:t>
+            </a:r>
+            <a:r>
+              <a:rPr lang="da-DK" dirty="0" smtClean="0"/>
+              <a:t> </a:t>
+            </a:r>
+            <a:r>
+              <a:rPr lang="da-DK" dirty="0" err="1" smtClean="0"/>
+              <a:t>reviews</a:t>
+            </a:r>
+            <a:r>
+              <a:rPr lang="da-DK" dirty="0" smtClean="0"/>
+              <a:t>.</a:t>
+            </a:r>
+            <a:endParaRPr lang="da-DK" dirty="0" smtClean="0"/>
+          </a:p>
+          <a:p>
+            <a:pPr lvl="1"/>
+            <a:r>
+              <a:rPr lang="da-DK" dirty="0" smtClean="0"/>
+              <a:t>Building the </a:t>
+            </a:r>
+            <a:r>
+              <a:rPr lang="da-DK" dirty="0" err="1" smtClean="0"/>
+              <a:t>unknown</a:t>
+            </a:r>
+            <a:r>
+              <a:rPr lang="da-DK" dirty="0" smtClean="0"/>
+              <a:t> </a:t>
+            </a:r>
+            <a:r>
+              <a:rPr lang="da-DK" dirty="0" smtClean="0"/>
+              <a:t>in 32 </a:t>
+            </a:r>
+            <a:r>
+              <a:rPr lang="da-DK" dirty="0" err="1" smtClean="0"/>
+              <a:t>hours</a:t>
+            </a:r>
+            <a:r>
+              <a:rPr lang="da-DK" dirty="0" smtClean="0"/>
+              <a:t>.</a:t>
+            </a:r>
           </a:p>
         </p:txBody>
       </p:sp>

</xml_diff>

<commit_message>
Updating presentation with missile coverage
</commit_message>
<xml_diff>
--- a/presentation/presentation.pptx
+++ b/presentation/presentation.pptx
@@ -5,7 +5,7 @@
     <p:sldMasterId id="2147483648" r:id="rId1"/>
   </p:sldMasterIdLst>
   <p:notesMasterIdLst>
-    <p:notesMasterId r:id="rId12"/>
+    <p:notesMasterId r:id="rId13"/>
   </p:notesMasterIdLst>
   <p:sldIdLst>
     <p:sldId id="256" r:id="rId2"/>
@@ -14,10 +14,11 @@
     <p:sldId id="259" r:id="rId5"/>
     <p:sldId id="264" r:id="rId6"/>
     <p:sldId id="263" r:id="rId7"/>
-    <p:sldId id="265" r:id="rId8"/>
-    <p:sldId id="266" r:id="rId9"/>
-    <p:sldId id="267" r:id="rId10"/>
-    <p:sldId id="268" r:id="rId11"/>
+    <p:sldId id="269" r:id="rId8"/>
+    <p:sldId id="265" r:id="rId9"/>
+    <p:sldId id="266" r:id="rId10"/>
+    <p:sldId id="267" r:id="rId11"/>
+    <p:sldId id="268" r:id="rId12"/>
   </p:sldIdLst>
   <p:sldSz cx="9144000" cy="6858000" type="screen4x3"/>
   <p:notesSz cx="6858000" cy="9144000"/>
@@ -202,7 +203,7 @@
             <a:fld id="{5B7080A6-174A-4C66-BA50-84374606274C}" type="datetimeFigureOut">
               <a:rPr lang="da-DK" smtClean="0"/>
               <a:pPr/>
-              <a:t>12-10-2010</a:t>
+              <a:t>14-10-2010</a:t>
             </a:fld>
             <a:endParaRPr lang="da-DK"/>
           </a:p>
@@ -650,7 +651,7 @@
             <a:fld id="{51D3954A-F719-4FAA-B465-899152882B07}" type="datetime1">
               <a:rPr lang="da-DK" smtClean="0"/>
               <a:pPr/>
-              <a:t>12-10-2010</a:t>
+              <a:t>14-10-2010</a:t>
             </a:fld>
             <a:endParaRPr lang="da-DK"/>
           </a:p>
@@ -821,7 +822,7 @@
             <a:fld id="{68A86CCA-906E-41DE-834F-6FA49EE9A582}" type="datetime1">
               <a:rPr lang="da-DK" smtClean="0"/>
               <a:pPr/>
-              <a:t>12-10-2010</a:t>
+              <a:t>14-10-2010</a:t>
             </a:fld>
             <a:endParaRPr lang="da-DK"/>
           </a:p>
@@ -1002,7 +1003,7 @@
             <a:fld id="{CB61EBFE-DBB5-46BC-BBCE-963CC3AC159F}" type="datetime1">
               <a:rPr lang="da-DK" smtClean="0"/>
               <a:pPr/>
-              <a:t>12-10-2010</a:t>
+              <a:t>14-10-2010</a:t>
             </a:fld>
             <a:endParaRPr lang="da-DK"/>
           </a:p>
@@ -1173,7 +1174,7 @@
             <a:fld id="{E0E4BFDC-91AB-4686-B4AF-D8869D385F56}" type="datetime1">
               <a:rPr lang="da-DK" smtClean="0"/>
               <a:pPr/>
-              <a:t>12-10-2010</a:t>
+              <a:t>14-10-2010</a:t>
             </a:fld>
             <a:endParaRPr lang="da-DK"/>
           </a:p>
@@ -1420,7 +1421,7 @@
             <a:fld id="{F6476349-2D54-4701-87D9-2945C863656F}" type="datetime1">
               <a:rPr lang="da-DK" smtClean="0"/>
               <a:pPr/>
-              <a:t>12-10-2010</a:t>
+              <a:t>14-10-2010</a:t>
             </a:fld>
             <a:endParaRPr lang="da-DK"/>
           </a:p>
@@ -1709,7 +1710,7 @@
             <a:fld id="{51EA12AB-CFC8-4D4B-B14B-BB2ABF72F4E6}" type="datetime1">
               <a:rPr lang="da-DK" smtClean="0"/>
               <a:pPr/>
-              <a:t>12-10-2010</a:t>
+              <a:t>14-10-2010</a:t>
             </a:fld>
             <a:endParaRPr lang="da-DK"/>
           </a:p>
@@ -2132,7 +2133,7 @@
             <a:fld id="{D9B8226D-2E7F-4167-A84F-9EEB33B2B289}" type="datetime1">
               <a:rPr lang="da-DK" smtClean="0"/>
               <a:pPr/>
-              <a:t>12-10-2010</a:t>
+              <a:t>14-10-2010</a:t>
             </a:fld>
             <a:endParaRPr lang="da-DK"/>
           </a:p>
@@ -2251,7 +2252,7 @@
             <a:fld id="{B7176596-6888-4E4A-8797-DAE3E9446158}" type="datetime1">
               <a:rPr lang="da-DK" smtClean="0"/>
               <a:pPr/>
-              <a:t>12-10-2010</a:t>
+              <a:t>14-10-2010</a:t>
             </a:fld>
             <a:endParaRPr lang="da-DK"/>
           </a:p>
@@ -2347,7 +2348,7 @@
             <a:fld id="{BF1159E7-A5F3-401D-9729-F27001EA67DA}" type="datetime1">
               <a:rPr lang="da-DK" smtClean="0"/>
               <a:pPr/>
-              <a:t>12-10-2010</a:t>
+              <a:t>14-10-2010</a:t>
             </a:fld>
             <a:endParaRPr lang="da-DK"/>
           </a:p>
@@ -2625,7 +2626,7 @@
             <a:fld id="{DC2D538F-39C5-494C-91E5-2BA1E9A77173}" type="datetime1">
               <a:rPr lang="da-DK" smtClean="0"/>
               <a:pPr/>
-              <a:t>12-10-2010</a:t>
+              <a:t>14-10-2010</a:t>
             </a:fld>
             <a:endParaRPr lang="da-DK"/>
           </a:p>
@@ -2879,7 +2880,7 @@
             <a:fld id="{CD0B4A37-07AE-43F5-B78D-D9B699EB0EA9}" type="datetime1">
               <a:rPr lang="da-DK" smtClean="0"/>
               <a:pPr/>
-              <a:t>12-10-2010</a:t>
+              <a:t>14-10-2010</a:t>
             </a:fld>
             <a:endParaRPr lang="da-DK"/>
           </a:p>
@@ -3093,7 +3094,7 @@
             <a:fld id="{7652BC4C-5B7A-4559-A7CD-8BE26A100ABA}" type="datetime1">
               <a:rPr lang="da-DK" smtClean="0"/>
               <a:pPr/>
-              <a:t>12-10-2010</a:t>
+              <a:t>14-10-2010</a:t>
             </a:fld>
             <a:endParaRPr lang="da-DK"/>
           </a:p>
@@ -3496,10 +3497,10 @@
           <a:lstStyle/>
           <a:p>
             <a:r>
-              <a:rPr lang="en-GB" sz="5400" b="1" dirty="0" smtClean="0"/>
+              <a:rPr lang="en-AU" sz="5400" b="1" smtClean="0"/>
               <a:t>Self Protecting Suite for F-16</a:t>
             </a:r>
-            <a:endParaRPr lang="da-DK" sz="5400" dirty="0"/>
+            <a:endParaRPr lang="en-AU" sz="5400" dirty="0"/>
           </a:p>
         </p:txBody>
       </p:sp>
@@ -3545,10 +3546,10 @@
           <a:lstStyle/>
           <a:p>
             <a:r>
-              <a:rPr lang="da-DK" smtClean="0"/>
+              <a:rPr lang="en-AU" smtClean="0"/>
               <a:t>Company F</a:t>
             </a:r>
-            <a:endParaRPr lang="da-DK"/>
+            <a:endParaRPr lang="en-AU"/>
           </a:p>
         </p:txBody>
       </p:sp>
@@ -3575,42 +3576,10 @@
           <a:lstStyle/>
           <a:p>
             <a:r>
-              <a:rPr lang="da-DK" sz="3200" dirty="0" smtClean="0"/>
-              <a:t>The </a:t>
-            </a:r>
-            <a:r>
-              <a:rPr lang="da-DK" sz="3200" dirty="0" err="1" smtClean="0"/>
-              <a:t>best</a:t>
-            </a:r>
-            <a:r>
-              <a:rPr lang="da-DK" sz="3200" dirty="0" smtClean="0"/>
-              <a:t> </a:t>
-            </a:r>
-            <a:r>
-              <a:rPr lang="da-DK" sz="3200" dirty="0" err="1" smtClean="0"/>
-              <a:t>defence</a:t>
-            </a:r>
-            <a:r>
-              <a:rPr lang="da-DK" sz="3200" dirty="0" smtClean="0"/>
-              <a:t> is not </a:t>
-            </a:r>
-            <a:r>
-              <a:rPr lang="da-DK" sz="3200" dirty="0" err="1" smtClean="0"/>
-              <a:t>always</a:t>
-            </a:r>
-            <a:r>
-              <a:rPr lang="da-DK" sz="3200" dirty="0" smtClean="0"/>
-              <a:t> an </a:t>
-            </a:r>
-            <a:r>
-              <a:rPr lang="da-DK" sz="3200" dirty="0" err="1" smtClean="0"/>
-              <a:t>attack</a:t>
-            </a:r>
-            <a:r>
-              <a:rPr lang="da-DK" sz="3200" dirty="0" smtClean="0"/>
-              <a:t>!</a:t>
-            </a:r>
-            <a:endParaRPr lang="da-DK" sz="3200" dirty="0"/>
+              <a:rPr lang="en-AU" sz="3200" smtClean="0"/>
+              <a:t>The best defence is not always an attack!</a:t>
+            </a:r>
+            <a:endParaRPr lang="en-AU" sz="3200" dirty="0"/>
           </a:p>
         </p:txBody>
       </p:sp>
@@ -3619,6 +3588,13 @@
   <p:clrMapOvr>
     <a:masterClrMapping/>
   </p:clrMapOvr>
+  <p:timing>
+    <p:tnLst>
+      <p:par>
+        <p:cTn id="1" dur="indefinite" restart="never" nodeType="tmRoot"/>
+      </p:par>
+    </p:tnLst>
+  </p:timing>
 </p:sld>
 </file>
 
@@ -3655,14 +3631,69 @@
           <a:lstStyle/>
           <a:p>
             <a:r>
-              <a:rPr lang="da-DK" dirty="0" err="1" smtClean="0"/>
-              <a:t>Questions</a:t>
-            </a:r>
-            <a:r>
-              <a:rPr lang="da-DK" dirty="0" smtClean="0"/>
-              <a:t>?</a:t>
-            </a:r>
-            <a:endParaRPr lang="da-DK" dirty="0"/>
+              <a:rPr lang="en-AU" smtClean="0"/>
+              <a:t>The process</a:t>
+            </a:r>
+            <a:endParaRPr lang="en-AU" dirty="0"/>
+          </a:p>
+        </p:txBody>
+      </p:sp>
+      <p:sp>
+        <p:nvSpPr>
+          <p:cNvPr id="3" name="Pladsholder til indhold 2"/>
+          <p:cNvSpPr>
+            <a:spLocks noGrp="1"/>
+          </p:cNvSpPr>
+          <p:nvPr>
+            <p:ph idx="1"/>
+          </p:nvPr>
+        </p:nvSpPr>
+        <p:spPr/>
+        <p:txBody>
+          <a:bodyPr/>
+          <a:lstStyle/>
+          <a:p>
+            <a:r>
+              <a:rPr lang="en-AU" dirty="0" smtClean="0"/>
+              <a:t>We at Company F believe in employing the best, and when the best won’t come to you, you must </a:t>
+            </a:r>
+            <a:r>
+              <a:rPr lang="en-AU" dirty="0" smtClean="0"/>
+              <a:t>go</a:t>
+            </a:r>
+            <a:r>
+              <a:rPr lang="en-AU" dirty="0" smtClean="0"/>
+              <a:t> to the best.</a:t>
+            </a:r>
+          </a:p>
+          <a:p>
+            <a:pPr lvl="1"/>
+            <a:r>
+              <a:rPr lang="en-AU" dirty="0" smtClean="0"/>
+              <a:t>Geographically distributed development.</a:t>
+            </a:r>
+          </a:p>
+          <a:p>
+            <a:pPr lvl="1"/>
+            <a:r>
+              <a:rPr lang="en-AU" dirty="0" smtClean="0"/>
+              <a:t>Google code, Wiki, Subversion, meetings and late nights.</a:t>
+            </a:r>
+          </a:p>
+          <a:p>
+            <a:pPr lvl="1"/>
+            <a:r>
+              <a:rPr lang="en-AU" dirty="0" smtClean="0"/>
+              <a:t>Internal reviews.</a:t>
+            </a:r>
+          </a:p>
+          <a:p>
+            <a:pPr lvl="1"/>
+            <a:r>
+              <a:rPr lang="en-AU" dirty="0" smtClean="0"/>
+              <a:t>Building the unknown in 32 hours.</a:t>
+            </a:r>
+            <a:endParaRPr lang="en-AU" dirty="0" smtClean="0"/>
           </a:p>
         </p:txBody>
       </p:sp>
@@ -3682,10 +3713,88 @@
           <a:lstStyle/>
           <a:p>
             <a:r>
-              <a:rPr lang="da-DK" smtClean="0"/>
+              <a:rPr lang="en-AU" smtClean="0"/>
               <a:t>Company F</a:t>
             </a:r>
-            <a:endParaRPr lang="da-DK"/>
+            <a:endParaRPr lang="en-AU"/>
+          </a:p>
+        </p:txBody>
+      </p:sp>
+    </p:spTree>
+  </p:cSld>
+  <p:clrMapOvr>
+    <a:masterClrMapping/>
+  </p:clrMapOvr>
+  <p:timing>
+    <p:tnLst>
+      <p:par>
+        <p:cTn id="1" dur="indefinite" restart="never" nodeType="tmRoot"/>
+      </p:par>
+    </p:tnLst>
+  </p:timing>
+</p:sld>
+</file>
+
+<file path=ppt/slides/slide11.xml><?xml version="1.0" encoding="utf-8"?>
+<p:sld xmlns:a="http://schemas.openxmlformats.org/drawingml/2006/main" xmlns:r="http://schemas.openxmlformats.org/officeDocument/2006/relationships" xmlns:p="http://schemas.openxmlformats.org/presentationml/2006/main">
+  <p:cSld>
+    <p:spTree>
+      <p:nvGrpSpPr>
+        <p:cNvPr id="1" name=""/>
+        <p:cNvGrpSpPr/>
+        <p:nvPr/>
+      </p:nvGrpSpPr>
+      <p:grpSpPr>
+        <a:xfrm>
+          <a:off x="0" y="0"/>
+          <a:ext cx="0" cy="0"/>
+          <a:chOff x="0" y="0"/>
+          <a:chExt cx="0" cy="0"/>
+        </a:xfrm>
+      </p:grpSpPr>
+      <p:sp>
+        <p:nvSpPr>
+          <p:cNvPr id="2" name="Titel 1"/>
+          <p:cNvSpPr>
+            <a:spLocks noGrp="1"/>
+          </p:cNvSpPr>
+          <p:nvPr>
+            <p:ph type="title"/>
+          </p:nvPr>
+        </p:nvSpPr>
+        <p:spPr/>
+        <p:txBody>
+          <a:bodyPr/>
+          <a:lstStyle/>
+          <a:p>
+            <a:r>
+              <a:rPr lang="en-AU" smtClean="0"/>
+              <a:t>Questions?</a:t>
+            </a:r>
+            <a:endParaRPr lang="en-AU" dirty="0"/>
+          </a:p>
+        </p:txBody>
+      </p:sp>
+      <p:sp>
+        <p:nvSpPr>
+          <p:cNvPr id="4" name="Pladsholder til sidefod 3"/>
+          <p:cNvSpPr>
+            <a:spLocks noGrp="1"/>
+          </p:cNvSpPr>
+          <p:nvPr>
+            <p:ph type="ftr" sz="quarter" idx="11"/>
+          </p:nvPr>
+        </p:nvSpPr>
+        <p:spPr/>
+        <p:txBody>
+          <a:bodyPr/>
+          <a:lstStyle/>
+          <a:p>
+            <a:r>
+              <a:rPr lang="en-AU" smtClean="0"/>
+              <a:t>Company F</a:t>
+            </a:r>
+            <a:endParaRPr lang="en-AU"/>
           </a:p>
         </p:txBody>
       </p:sp>
@@ -3720,6 +3829,13 @@
   <p:clrMapOvr>
     <a:masterClrMapping/>
   </p:clrMapOvr>
+  <p:timing>
+    <p:tnLst>
+      <p:par>
+        <p:cTn id="1" dur="indefinite" restart="never" nodeType="tmRoot"/>
+      </p:par>
+    </p:tnLst>
+  </p:timing>
 </p:sld>
 </file>
 
@@ -3782,10 +3898,10 @@
           <a:lstStyle/>
           <a:p>
             <a:r>
-              <a:rPr lang="da-DK" smtClean="0"/>
+              <a:rPr lang="en-AU" smtClean="0"/>
               <a:t>Company F</a:t>
             </a:r>
-            <a:endParaRPr lang="da-DK"/>
+            <a:endParaRPr lang="en-AU"/>
           </a:p>
         </p:txBody>
       </p:sp>
@@ -3812,37 +3928,10 @@
           <a:lstStyle/>
           <a:p>
             <a:r>
-              <a:rPr lang="da-DK" sz="3200" dirty="0" err="1" smtClean="0"/>
-              <a:t>Why</a:t>
-            </a:r>
-            <a:r>
-              <a:rPr lang="da-DK" sz="3200" dirty="0" smtClean="0"/>
-              <a:t> </a:t>
-            </a:r>
-            <a:r>
-              <a:rPr lang="da-DK" sz="3200" dirty="0" err="1" smtClean="0"/>
-              <a:t>does</a:t>
-            </a:r>
-            <a:r>
-              <a:rPr lang="da-DK" sz="3200" dirty="0" smtClean="0"/>
-              <a:t> an F-16 </a:t>
-            </a:r>
-            <a:r>
-              <a:rPr lang="da-DK" sz="3200" dirty="0" err="1" smtClean="0"/>
-              <a:t>need</a:t>
-            </a:r>
-            <a:r>
-              <a:rPr lang="da-DK" sz="3200" dirty="0" smtClean="0"/>
-              <a:t> </a:t>
-            </a:r>
-            <a:r>
-              <a:rPr lang="da-DK" sz="3200" dirty="0" err="1" smtClean="0"/>
-              <a:t>protection</a:t>
-            </a:r>
-            <a:r>
-              <a:rPr lang="da-DK" sz="3200" dirty="0" smtClean="0"/>
-              <a:t>?</a:t>
-            </a:r>
+              <a:rPr lang="en-AU" sz="3200" smtClean="0"/>
+              <a:t>Why does an F-16 need protection?</a:t>
+            </a:r>
+            <a:endParaRPr lang="en-AU" sz="3200" dirty="0" smtClean="0"/>
           </a:p>
         </p:txBody>
       </p:sp>
@@ -3869,190 +3958,22 @@
           <a:lstStyle/>
           <a:p>
             <a:r>
-              <a:rPr lang="da-DK" dirty="0" smtClean="0"/>
-              <a:t>Over the last 10 </a:t>
-            </a:r>
-            <a:r>
-              <a:rPr lang="da-DK" dirty="0" err="1" smtClean="0"/>
-              <a:t>years</a:t>
-            </a:r>
-            <a:r>
-              <a:rPr lang="da-DK" dirty="0" smtClean="0"/>
-              <a:t> the portable </a:t>
-            </a:r>
-            <a:r>
-              <a:rPr lang="da-DK" dirty="0" err="1" smtClean="0"/>
-              <a:t>ultra-light</a:t>
-            </a:r>
-            <a:r>
-              <a:rPr lang="da-DK" dirty="0" smtClean="0"/>
-              <a:t> </a:t>
-            </a:r>
-            <a:r>
-              <a:rPr lang="da-DK" dirty="0" err="1" smtClean="0"/>
-              <a:t>heat-seaking</a:t>
-            </a:r>
-            <a:r>
-              <a:rPr lang="da-DK" dirty="0" smtClean="0"/>
-              <a:t> </a:t>
-            </a:r>
-            <a:r>
-              <a:rPr lang="da-DK" dirty="0" err="1" smtClean="0"/>
-              <a:t>ground-to-air</a:t>
-            </a:r>
-            <a:r>
-              <a:rPr lang="da-DK" dirty="0" smtClean="0"/>
-              <a:t> missile</a:t>
-            </a:r>
-          </a:p>
-          <a:p>
-            <a:r>
-              <a:rPr lang="da-DK" dirty="0" smtClean="0"/>
-              <a:t>has </a:t>
-            </a:r>
-            <a:r>
-              <a:rPr lang="da-DK" dirty="0" err="1" smtClean="0"/>
-              <a:t>become</a:t>
-            </a:r>
-            <a:r>
-              <a:rPr lang="da-DK" dirty="0" smtClean="0"/>
-              <a:t> the </a:t>
-            </a:r>
-            <a:r>
-              <a:rPr lang="da-DK" dirty="0" err="1" smtClean="0"/>
-              <a:t>personal</a:t>
-            </a:r>
-            <a:r>
-              <a:rPr lang="da-DK" dirty="0" smtClean="0"/>
-              <a:t> </a:t>
-            </a:r>
-            <a:r>
-              <a:rPr lang="da-DK" dirty="0" err="1" smtClean="0"/>
-              <a:t>property</a:t>
-            </a:r>
-            <a:r>
-              <a:rPr lang="da-DK" dirty="0" smtClean="0"/>
-              <a:t> of </a:t>
-            </a:r>
-            <a:r>
-              <a:rPr lang="da-DK" dirty="0" err="1" smtClean="0"/>
-              <a:t>any</a:t>
-            </a:r>
-            <a:r>
-              <a:rPr lang="da-DK" dirty="0" smtClean="0"/>
-              <a:t> </a:t>
-            </a:r>
-            <a:r>
-              <a:rPr lang="da-DK" dirty="0" err="1" smtClean="0"/>
-              <a:t>self-respecting</a:t>
-            </a:r>
-            <a:r>
-              <a:rPr lang="da-DK" dirty="0" smtClean="0"/>
-              <a:t> </a:t>
-            </a:r>
-            <a:r>
-              <a:rPr lang="da-DK" dirty="0" err="1" smtClean="0"/>
-              <a:t>warloard</a:t>
-            </a:r>
-            <a:r>
-              <a:rPr lang="da-DK" dirty="0" smtClean="0"/>
-              <a:t> </a:t>
-            </a:r>
-            <a:r>
-              <a:rPr lang="da-DK" dirty="0" err="1" smtClean="0"/>
-              <a:t>or</a:t>
-            </a:r>
-            <a:r>
-              <a:rPr lang="da-DK" dirty="0" smtClean="0"/>
-              <a:t> </a:t>
-            </a:r>
-            <a:r>
-              <a:rPr lang="da-DK" dirty="0" err="1" smtClean="0"/>
-              <a:t>drug-dealer</a:t>
-            </a:r>
-            <a:r>
-              <a:rPr lang="da-DK" dirty="0" smtClean="0"/>
-              <a:t>,</a:t>
-            </a:r>
-          </a:p>
-          <a:p>
-            <a:r>
-              <a:rPr lang="da-DK" dirty="0" smtClean="0"/>
-              <a:t>not to </a:t>
-            </a:r>
-            <a:r>
-              <a:rPr lang="da-DK" dirty="0" err="1" smtClean="0"/>
-              <a:t>mention</a:t>
-            </a:r>
-            <a:r>
-              <a:rPr lang="da-DK" dirty="0" smtClean="0"/>
-              <a:t> </a:t>
-            </a:r>
-            <a:r>
-              <a:rPr lang="da-DK" dirty="0" err="1" smtClean="0"/>
-              <a:t>hostile</a:t>
-            </a:r>
-            <a:r>
-              <a:rPr lang="da-DK" dirty="0" smtClean="0"/>
-              <a:t> </a:t>
-            </a:r>
-            <a:r>
-              <a:rPr lang="da-DK" dirty="0" err="1" smtClean="0"/>
-              <a:t>nationes</a:t>
-            </a:r>
-            <a:r>
-              <a:rPr lang="da-DK" dirty="0" smtClean="0"/>
-              <a:t> </a:t>
-            </a:r>
-            <a:r>
-              <a:rPr lang="da-DK" dirty="0" err="1" smtClean="0"/>
-              <a:t>or</a:t>
-            </a:r>
-            <a:r>
-              <a:rPr lang="da-DK" dirty="0" smtClean="0"/>
-              <a:t> </a:t>
-            </a:r>
-            <a:r>
-              <a:rPr lang="da-DK" dirty="0" err="1" smtClean="0"/>
-              <a:t>rogue</a:t>
-            </a:r>
-            <a:r>
-              <a:rPr lang="da-DK" dirty="0" smtClean="0"/>
-              <a:t> </a:t>
-            </a:r>
-            <a:r>
-              <a:rPr lang="da-DK" dirty="0" err="1" smtClean="0"/>
-              <a:t>fractions</a:t>
-            </a:r>
-            <a:r>
-              <a:rPr lang="da-DK" dirty="0" smtClean="0"/>
-              <a:t> </a:t>
-            </a:r>
-            <a:r>
-              <a:rPr lang="da-DK" dirty="0" err="1" smtClean="0"/>
-              <a:t>within</a:t>
-            </a:r>
-            <a:r>
-              <a:rPr lang="da-DK" dirty="0" smtClean="0"/>
-              <a:t> </a:t>
-            </a:r>
-            <a:r>
-              <a:rPr lang="da-DK" dirty="0" err="1" smtClean="0"/>
-              <a:t>our</a:t>
-            </a:r>
-            <a:r>
-              <a:rPr lang="da-DK" dirty="0" smtClean="0"/>
-              <a:t> </a:t>
-            </a:r>
-            <a:r>
-              <a:rPr lang="da-DK" dirty="0" err="1" smtClean="0"/>
-              <a:t>allies</a:t>
-            </a:r>
-            <a:r>
-              <a:rPr lang="da-DK" dirty="0" smtClean="0"/>
-              <a:t>.</a:t>
-            </a:r>
-            <a:endParaRPr lang="da-DK" dirty="0"/>
+              <a:rPr lang="en-AU" smtClean="0"/>
+              <a:t>Over the last 10 years the portable ultra-light heat-seaking ground-to-air missile</a:t>
+            </a:r>
+          </a:p>
+          <a:p>
+            <a:r>
+              <a:rPr lang="en-AU" smtClean="0"/>
+              <a:t>has become the personal property of any self-respecting warloard or drug-dealer,</a:t>
+            </a:r>
+          </a:p>
+          <a:p>
+            <a:r>
+              <a:rPr lang="en-AU" smtClean="0"/>
+              <a:t>not to mention hostile nations or rogue fractions within our allies.</a:t>
+            </a:r>
+            <a:endParaRPr lang="en-AU" dirty="0"/>
           </a:p>
         </p:txBody>
       </p:sp>
@@ -4061,6 +3982,13 @@
   <p:clrMapOvr>
     <a:masterClrMapping/>
   </p:clrMapOvr>
+  <p:timing>
+    <p:tnLst>
+      <p:par>
+        <p:cTn id="1" dur="indefinite" restart="never" nodeType="tmRoot"/>
+      </p:par>
+    </p:tnLst>
+  </p:timing>
 </p:sld>
 </file>
 
@@ -4097,10 +4025,10 @@
           <a:lstStyle/>
           <a:p>
             <a:r>
-              <a:rPr lang="da-DK" smtClean="0"/>
+              <a:rPr lang="en-AU" smtClean="0"/>
               <a:t>Company F</a:t>
             </a:r>
-            <a:endParaRPr lang="da-DK"/>
+            <a:endParaRPr lang="en-AU"/>
           </a:p>
         </p:txBody>
       </p:sp>
@@ -4127,28 +4055,28 @@
           <a:lstStyle/>
           <a:p>
             <a:r>
-              <a:rPr lang="en-US" sz="3200" dirty="0" smtClean="0"/>
+              <a:rPr lang="en-AU" sz="3200" dirty="0" smtClean="0"/>
               <a:t>Alternatives?</a:t>
             </a:r>
           </a:p>
           <a:p>
             <a:r>
-              <a:rPr lang="en-US" sz="3200" dirty="0" smtClean="0"/>
+              <a:rPr lang="en-AU" sz="3200" dirty="0" smtClean="0"/>
               <a:t>  - Accept the risk</a:t>
             </a:r>
           </a:p>
           <a:p>
             <a:r>
-              <a:rPr lang="en-US" sz="3200" dirty="0" smtClean="0"/>
+              <a:rPr lang="en-AU" sz="3200" dirty="0" smtClean="0"/>
               <a:t>  - Avoid conflicts</a:t>
             </a:r>
           </a:p>
           <a:p>
             <a:r>
-              <a:rPr lang="en-US" sz="3200" dirty="0" smtClean="0"/>
+              <a:rPr lang="en-AU" sz="3200" dirty="0" smtClean="0"/>
               <a:t>  - Company F Self protection suite for F-16</a:t>
             </a:r>
-            <a:endParaRPr lang="en-US" sz="3200" dirty="0" smtClean="0"/>
+            <a:endParaRPr lang="en-AU" sz="3200" dirty="0" smtClean="0"/>
           </a:p>
         </p:txBody>
       </p:sp>
@@ -4189,6 +4117,13 @@
   <p:clrMapOvr>
     <a:masterClrMapping/>
   </p:clrMapOvr>
+  <p:timing>
+    <p:tnLst>
+      <p:par>
+        <p:cTn id="1" dur="indefinite" restart="never" nodeType="tmRoot"/>
+      </p:par>
+    </p:tnLst>
+  </p:timing>
 </p:sld>
 </file>
 
@@ -4225,10 +4160,10 @@
           <a:lstStyle/>
           <a:p>
             <a:r>
-              <a:rPr lang="da-DK" smtClean="0"/>
+              <a:rPr lang="en-AU" smtClean="0"/>
               <a:t>Company F</a:t>
             </a:r>
-            <a:endParaRPr lang="da-DK"/>
+            <a:endParaRPr lang="en-AU"/>
           </a:p>
         </p:txBody>
       </p:sp>
@@ -4254,22 +4189,10 @@
           <a:lstStyle/>
           <a:p>
             <a:r>
-              <a:rPr lang="da-DK" sz="4400" dirty="0" err="1" smtClean="0"/>
-              <a:t>Why</a:t>
-            </a:r>
-            <a:r>
-              <a:rPr lang="da-DK" sz="4400" dirty="0" smtClean="0"/>
-              <a:t> not just run the </a:t>
-            </a:r>
-            <a:r>
-              <a:rPr lang="da-DK" sz="4400" dirty="0" err="1" smtClean="0"/>
-              <a:t>risk</a:t>
-            </a:r>
-            <a:r>
-              <a:rPr lang="da-DK" sz="4400" dirty="0" smtClean="0"/>
-              <a:t>?</a:t>
-            </a:r>
-            <a:endParaRPr lang="da-DK" sz="4400" dirty="0"/>
+              <a:rPr lang="en-AU" sz="4400" smtClean="0"/>
+              <a:t>Why not just run the risk?</a:t>
+            </a:r>
+            <a:endParaRPr lang="en-AU" sz="4400" dirty="0"/>
           </a:p>
         </p:txBody>
       </p:sp>
@@ -4299,21 +4222,21 @@
               <a:buAutoNum type="arabicPeriod"/>
             </a:pPr>
             <a:r>
-              <a:rPr lang="en-US" sz="2800" dirty="0" smtClean="0"/>
+              <a:rPr lang="en-AU" sz="2800" smtClean="0"/>
               <a:t>It costs more than 10 million DKR to train </a:t>
             </a:r>
           </a:p>
           <a:p>
             <a:pPr marL="514350" indent="-514350"/>
             <a:r>
-              <a:rPr lang="en-US" sz="2800" dirty="0" smtClean="0"/>
+              <a:rPr lang="en-AU" sz="2800" smtClean="0"/>
               <a:t>	just one F-16 fighter pilot, and that does </a:t>
             </a:r>
           </a:p>
           <a:p>
             <a:pPr marL="514350" indent="-514350"/>
             <a:r>
-              <a:rPr lang="en-US" sz="2800" dirty="0" smtClean="0"/>
+              <a:rPr lang="en-AU" sz="2800" smtClean="0"/>
               <a:t>	not include experience.</a:t>
             </a:r>
           </a:p>
@@ -4323,14 +4246,14 @@
               <a:buAutoNum type="arabicPeriod" startAt="2"/>
             </a:pPr>
             <a:r>
-              <a:rPr lang="en-US" sz="2800" dirty="0" smtClean="0"/>
+              <a:rPr lang="en-AU" sz="2800" smtClean="0"/>
               <a:t>An F-16 costs approximately 50-55 million USD</a:t>
             </a:r>
           </a:p>
           <a:p>
             <a:pPr marL="514350" indent="-514350"/>
             <a:r>
-              <a:rPr lang="en-US" sz="2800" dirty="0" smtClean="0"/>
+              <a:rPr lang="en-AU" sz="2800" smtClean="0"/>
               <a:t>	= 302,5 million DKR</a:t>
             </a:r>
           </a:p>
@@ -4340,20 +4263,20 @@
               <a:buAutoNum type="arabicPeriod" startAt="3"/>
             </a:pPr>
             <a:r>
-              <a:rPr lang="en-US" sz="2800" dirty="0" smtClean="0"/>
+              <a:rPr lang="en-AU" sz="2800" smtClean="0"/>
               <a:t>No one wants to explain an avoidable loss of </a:t>
             </a:r>
           </a:p>
           <a:p>
             <a:pPr marL="514350" indent="-514350"/>
             <a:r>
-              <a:rPr lang="en-US" sz="2800" dirty="0" smtClean="0"/>
+              <a:rPr lang="en-AU" sz="2800" smtClean="0"/>
               <a:t>	life to the family, the public and the politicians.</a:t>
             </a:r>
           </a:p>
           <a:p>
             <a:pPr marL="514350" indent="-514350"/>
-            <a:endParaRPr lang="en-US" sz="2800" dirty="0" smtClean="0"/>
+            <a:endParaRPr lang="en-AU" sz="2800" dirty="0" smtClean="0"/>
           </a:p>
         </p:txBody>
       </p:sp>
@@ -4362,6 +4285,13 @@
   <p:clrMapOvr>
     <a:masterClrMapping/>
   </p:clrMapOvr>
+  <p:timing>
+    <p:tnLst>
+      <p:par>
+        <p:cTn id="1" dur="indefinite" restart="never" nodeType="tmRoot"/>
+      </p:par>
+    </p:tnLst>
+  </p:timing>
 </p:sld>
 </file>
 
@@ -4398,10 +4328,10 @@
           <a:lstStyle/>
           <a:p>
             <a:r>
-              <a:rPr lang="da-DK" smtClean="0"/>
+              <a:rPr lang="en-AU" smtClean="0"/>
               <a:t>Company F</a:t>
             </a:r>
-            <a:endParaRPr lang="da-DK"/>
+            <a:endParaRPr lang="en-AU"/>
           </a:p>
         </p:txBody>
       </p:sp>
@@ -4427,30 +4357,10 @@
           <a:lstStyle/>
           <a:p>
             <a:r>
-              <a:rPr lang="da-DK" sz="4400" dirty="0" err="1" smtClean="0"/>
-              <a:t>What</a:t>
-            </a:r>
-            <a:r>
-              <a:rPr lang="da-DK" sz="4400" dirty="0" smtClean="0"/>
-              <a:t> </a:t>
-            </a:r>
-            <a:r>
-              <a:rPr lang="da-DK" sz="4400" dirty="0" err="1" smtClean="0"/>
-              <a:t>will</a:t>
-            </a:r>
-            <a:r>
-              <a:rPr lang="da-DK" sz="4400" dirty="0" smtClean="0"/>
-              <a:t> it </a:t>
-            </a:r>
-            <a:r>
-              <a:rPr lang="da-DK" sz="4400" dirty="0" err="1" smtClean="0"/>
-              <a:t>cost</a:t>
-            </a:r>
-            <a:r>
-              <a:rPr lang="da-DK" sz="4400" dirty="0" smtClean="0"/>
-              <a:t>?</a:t>
-            </a:r>
-            <a:endParaRPr lang="da-DK" sz="4400" dirty="0"/>
+              <a:rPr lang="en-AU" sz="4400" smtClean="0"/>
+              <a:t>What will it cost?</a:t>
+            </a:r>
+            <a:endParaRPr lang="en-AU" sz="4400" dirty="0"/>
           </a:p>
         </p:txBody>
       </p:sp>
@@ -4480,7 +4390,7 @@
               <a:buChar char="•"/>
             </a:pPr>
             <a:r>
-              <a:rPr lang="en-US" sz="2800" dirty="0" smtClean="0"/>
+              <a:rPr lang="en-AU" sz="2800" smtClean="0"/>
               <a:t>F-16s in Denmark: 62</a:t>
             </a:r>
           </a:p>
@@ -4490,7 +4400,7 @@
               <a:buChar char="•"/>
             </a:pPr>
             <a:r>
-              <a:rPr lang="en-US" sz="2800" dirty="0" smtClean="0"/>
+              <a:rPr lang="en-AU" sz="2800" smtClean="0"/>
               <a:t>Operational fleet: 32</a:t>
             </a:r>
           </a:p>
@@ -4500,72 +4410,52 @@
               <a:buChar char="•"/>
             </a:pPr>
             <a:r>
-              <a:rPr lang="en-US" sz="2800" dirty="0" smtClean="0"/>
+              <a:rPr lang="en-AU" sz="2800" smtClean="0"/>
               <a:t>Max combat fleet: 10</a:t>
             </a:r>
           </a:p>
           <a:p>
             <a:pPr marL="514350" indent="-514350"/>
             <a:r>
-              <a:rPr lang="en-US" sz="2800" dirty="0" smtClean="0"/>
+              <a:rPr lang="en-AU" sz="2800" smtClean="0"/>
               <a:t>The list price for outfitting one F-16 with the </a:t>
             </a:r>
           </a:p>
           <a:p>
             <a:pPr marL="514350" indent="-514350"/>
             <a:r>
-              <a:rPr lang="en-US" sz="2800" dirty="0" smtClean="0"/>
-              <a:t>Company F Self protection suite for F-16 </a:t>
-            </a:r>
-            <a:r>
-              <a:rPr lang="en-US" sz="2800" dirty="0" smtClean="0"/>
-              <a:t>is:</a:t>
-            </a:r>
-            <a:endParaRPr lang="en-US" sz="2800" dirty="0" smtClean="0"/>
+              <a:rPr lang="en-AU" sz="2800" smtClean="0"/>
+              <a:t>Company F Self protection suite for F-16 is:</a:t>
+            </a:r>
           </a:p>
           <a:p>
             <a:pPr marL="514350" indent="-514350"/>
             <a:r>
-              <a:rPr lang="en-US" sz="2800" dirty="0" smtClean="0"/>
+              <a:rPr lang="en-AU" sz="2800" smtClean="0"/>
               <a:t>   1 POD: 7,500,000.-</a:t>
             </a:r>
           </a:p>
           <a:p>
             <a:pPr marL="514350" indent="-514350"/>
             <a:r>
-              <a:rPr lang="en-US" sz="2800" dirty="0" smtClean="0"/>
+              <a:rPr lang="en-AU" sz="2800" smtClean="0"/>
               <a:t>   1 Cockpit unit: 500,000.-</a:t>
             </a:r>
           </a:p>
           <a:p>
             <a:pPr marL="514350" indent="-514350"/>
             <a:r>
-              <a:rPr lang="en-US" sz="2800" dirty="0" smtClean="0"/>
+              <a:rPr lang="en-AU" sz="2800" smtClean="0"/>
               <a:t>62 cockpit units + 10 PODs = 106million or</a:t>
             </a:r>
           </a:p>
           <a:p>
             <a:pPr marL="514350" indent="-514350"/>
             <a:r>
-              <a:rPr lang="en-US" sz="2800" dirty="0" smtClean="0"/>
-              <a:t>1/3 </a:t>
-            </a:r>
-            <a:r>
-              <a:rPr lang="en-US" sz="2800" dirty="0" smtClean="0"/>
-              <a:t>the </a:t>
-            </a:r>
-            <a:r>
-              <a:rPr lang="en-US" sz="2800" dirty="0" smtClean="0"/>
-              <a:t>price of one </a:t>
-            </a:r>
-            <a:r>
-              <a:rPr lang="en-US" sz="2800" dirty="0" smtClean="0"/>
-              <a:t>F-16 without a pilot</a:t>
-            </a:r>
-            <a:r>
-              <a:rPr lang="en-US" sz="2800" dirty="0" smtClean="0"/>
-              <a:t>.</a:t>
-            </a:r>
+              <a:rPr lang="en-AU" sz="2800" smtClean="0"/>
+              <a:t>1/3 the price of one F-16 without a pilot.</a:t>
+            </a:r>
+            <a:endParaRPr lang="en-AU" sz="2800" dirty="0" smtClean="0"/>
           </a:p>
         </p:txBody>
       </p:sp>
@@ -4591,18 +4481,10 @@
           <a:lstStyle/>
           <a:p>
             <a:r>
-              <a:rPr lang="da-DK" sz="4400" dirty="0" smtClean="0"/>
-              <a:t>It saves </a:t>
-            </a:r>
-            <a:r>
-              <a:rPr lang="da-DK" sz="4400" dirty="0" err="1" smtClean="0"/>
-              <a:t>money</a:t>
-            </a:r>
-            <a:r>
-              <a:rPr lang="da-DK" sz="4400" dirty="0" smtClean="0"/>
-              <a:t> AND lives!</a:t>
-            </a:r>
-            <a:endParaRPr lang="da-DK" sz="4400" dirty="0"/>
+              <a:rPr lang="en-AU" sz="4400" smtClean="0"/>
+              <a:t>It saves money AND lives!</a:t>
+            </a:r>
+            <a:endParaRPr lang="en-AU" sz="4400" dirty="0"/>
           </a:p>
         </p:txBody>
       </p:sp>
@@ -4611,6 +4493,13 @@
   <p:clrMapOvr>
     <a:masterClrMapping/>
   </p:clrMapOvr>
+  <p:timing>
+    <p:tnLst>
+      <p:par>
+        <p:cTn id="1" dur="indefinite" restart="never" nodeType="tmRoot"/>
+      </p:par>
+    </p:tnLst>
+  </p:timing>
 </p:sld>
 </file>
 
@@ -4647,14 +4536,10 @@
           <a:lstStyle/>
           <a:p>
             <a:r>
-              <a:rPr lang="da-DK" dirty="0" smtClean="0"/>
-              <a:t>The </a:t>
-            </a:r>
-            <a:r>
-              <a:rPr lang="da-DK" dirty="0" err="1" smtClean="0"/>
-              <a:t>requirements</a:t>
-            </a:r>
-            <a:endParaRPr lang="da-DK" dirty="0"/>
+              <a:rPr lang="en-AU" smtClean="0"/>
+              <a:t>The requirements</a:t>
+            </a:r>
+            <a:endParaRPr lang="en-AU" dirty="0"/>
           </a:p>
         </p:txBody>
       </p:sp>
@@ -4676,153 +4561,51 @@
         </p:spPr>
         <p:txBody>
           <a:bodyPr>
-            <a:normAutofit fontScale="92500" lnSpcReduction="10000"/>
+            <a:normAutofit fontScale="92500" lnSpcReduction="20000"/>
           </a:bodyPr>
           <a:lstStyle/>
           <a:p>
             <a:r>
-              <a:rPr lang="da-DK" dirty="0" smtClean="0"/>
-              <a:t>Optimal </a:t>
-            </a:r>
-            <a:r>
-              <a:rPr lang="da-DK" dirty="0" err="1" smtClean="0"/>
-              <a:t>coverage</a:t>
-            </a:r>
-            <a:endParaRPr lang="da-DK" dirty="0" smtClean="0"/>
-          </a:p>
-          <a:p>
-            <a:r>
-              <a:rPr lang="da-DK" dirty="0" smtClean="0"/>
-              <a:t>Do not interferer </a:t>
-            </a:r>
-            <a:r>
-              <a:rPr lang="da-DK" dirty="0" err="1" smtClean="0"/>
-              <a:t>with</a:t>
-            </a:r>
-            <a:r>
-              <a:rPr lang="da-DK" dirty="0" smtClean="0"/>
-              <a:t> </a:t>
-            </a:r>
-            <a:r>
-              <a:rPr lang="da-DK" dirty="0" err="1" smtClean="0"/>
-              <a:t>existing</a:t>
-            </a:r>
-            <a:r>
-              <a:rPr lang="da-DK" dirty="0" smtClean="0"/>
-              <a:t> systemet (</a:t>
-            </a:r>
-            <a:r>
-              <a:rPr lang="da-DK" dirty="0" err="1" smtClean="0"/>
-              <a:t>subcontractor</a:t>
-            </a:r>
-            <a:r>
-              <a:rPr lang="da-DK" dirty="0" smtClean="0"/>
-              <a:t>)</a:t>
-            </a:r>
-          </a:p>
-          <a:p>
-            <a:r>
-              <a:rPr lang="da-DK" dirty="0" err="1" smtClean="0"/>
-              <a:t>Use</a:t>
-            </a:r>
-            <a:r>
-              <a:rPr lang="da-DK" dirty="0" smtClean="0"/>
-              <a:t> GFE</a:t>
-            </a:r>
-          </a:p>
-          <a:p>
-            <a:r>
-              <a:rPr lang="da-DK" dirty="0" smtClean="0"/>
-              <a:t>PCU </a:t>
-            </a:r>
-            <a:r>
-              <a:rPr lang="da-DK" dirty="0" err="1" smtClean="0"/>
-              <a:t>available</a:t>
-            </a:r>
-            <a:endParaRPr lang="da-DK" dirty="0" smtClean="0"/>
-          </a:p>
-          <a:p>
-            <a:r>
-              <a:rPr lang="da-DK" dirty="0" err="1" smtClean="0"/>
-              <a:t>Ground</a:t>
-            </a:r>
-            <a:r>
-              <a:rPr lang="da-DK" dirty="0" smtClean="0"/>
-              <a:t> </a:t>
-            </a:r>
-            <a:r>
-              <a:rPr lang="da-DK" dirty="0" err="1" smtClean="0"/>
-              <a:t>dispense</a:t>
-            </a:r>
-            <a:r>
-              <a:rPr lang="da-DK" dirty="0" smtClean="0"/>
-              <a:t> </a:t>
-            </a:r>
-            <a:r>
-              <a:rPr lang="da-DK" dirty="0" err="1" smtClean="0"/>
-              <a:t>protection</a:t>
-            </a:r>
-            <a:endParaRPr lang="da-DK" dirty="0" smtClean="0"/>
-          </a:p>
-          <a:p>
-            <a:r>
-              <a:rPr lang="da-DK" dirty="0" err="1" smtClean="0"/>
-              <a:t>Customer</a:t>
-            </a:r>
-            <a:r>
-              <a:rPr lang="da-DK" dirty="0" smtClean="0"/>
-              <a:t> feedback</a:t>
-            </a:r>
-          </a:p>
-          <a:p>
-            <a:r>
-              <a:rPr lang="da-DK" dirty="0" err="1" smtClean="0"/>
-              <a:t>High</a:t>
-            </a:r>
-            <a:r>
-              <a:rPr lang="da-DK" dirty="0" smtClean="0"/>
-              <a:t> </a:t>
-            </a:r>
-            <a:r>
-              <a:rPr lang="da-DK" dirty="0" err="1" smtClean="0"/>
-              <a:t>detail</a:t>
-            </a:r>
-            <a:r>
-              <a:rPr lang="da-DK" dirty="0" smtClean="0"/>
-              <a:t> </a:t>
-            </a:r>
-            <a:r>
-              <a:rPr lang="da-DK" dirty="0" err="1" smtClean="0"/>
-              <a:t>level</a:t>
-            </a:r>
-            <a:r>
-              <a:rPr lang="da-DK" dirty="0" smtClean="0"/>
-              <a:t> in system </a:t>
-            </a:r>
-            <a:r>
-              <a:rPr lang="da-DK" dirty="0" err="1" smtClean="0"/>
-              <a:t>requirements</a:t>
-            </a:r>
-            <a:r>
-              <a:rPr lang="da-DK" dirty="0" smtClean="0"/>
-              <a:t> (missile </a:t>
-            </a:r>
-            <a:r>
-              <a:rPr lang="da-DK" dirty="0" err="1" smtClean="0"/>
-              <a:t>coverage</a:t>
-            </a:r>
-            <a:r>
-              <a:rPr lang="da-DK" dirty="0" smtClean="0"/>
-              <a:t>, power and </a:t>
-            </a:r>
-            <a:r>
-              <a:rPr lang="da-DK" dirty="0" err="1" smtClean="0"/>
-              <a:t>weight</a:t>
-            </a:r>
-            <a:r>
-              <a:rPr lang="da-DK" dirty="0" smtClean="0"/>
-              <a:t>, pin layout, …)</a:t>
-            </a:r>
+              <a:rPr lang="en-AU" dirty="0" smtClean="0"/>
+              <a:t>Optimal coverage</a:t>
+            </a:r>
+          </a:p>
+          <a:p>
+            <a:r>
+              <a:rPr lang="en-AU" dirty="0" smtClean="0"/>
+              <a:t>Do not interfere with the existing system (subcontractor)</a:t>
+            </a:r>
+          </a:p>
+          <a:p>
+            <a:r>
+              <a:rPr lang="en-AU" dirty="0" smtClean="0"/>
+              <a:t>Use GFE</a:t>
+            </a:r>
+          </a:p>
+          <a:p>
+            <a:r>
+              <a:rPr lang="en-AU" dirty="0" smtClean="0"/>
+              <a:t>PCU available</a:t>
+            </a:r>
+          </a:p>
+          <a:p>
+            <a:r>
+              <a:rPr lang="en-AU" dirty="0" smtClean="0"/>
+              <a:t>Ground dispense protection</a:t>
+            </a:r>
+          </a:p>
+          <a:p>
+            <a:r>
+              <a:rPr lang="en-AU" dirty="0" smtClean="0"/>
+              <a:t>Customer feedback</a:t>
+            </a:r>
+          </a:p>
+          <a:p>
+            <a:r>
+              <a:rPr lang="en-AU" dirty="0" smtClean="0"/>
+              <a:t>High detail level in system requirements (missile coverage, response pattern, power and weight, pin layout, …)</a:t>
+            </a:r>
+            <a:endParaRPr lang="en-AU" dirty="0" smtClean="0"/>
           </a:p>
         </p:txBody>
       </p:sp>
@@ -4842,10 +4625,10 @@
           <a:lstStyle/>
           <a:p>
             <a:r>
-              <a:rPr lang="da-DK" smtClean="0"/>
+              <a:rPr lang="en-AU" smtClean="0"/>
               <a:t>Company F</a:t>
             </a:r>
-            <a:endParaRPr lang="da-DK"/>
+            <a:endParaRPr lang="en-AU"/>
           </a:p>
         </p:txBody>
       </p:sp>
@@ -4854,6 +4637,13 @@
   <p:clrMapOvr>
     <a:masterClrMapping/>
   </p:clrMapOvr>
+  <p:timing>
+    <p:tnLst>
+      <p:par>
+        <p:cTn id="1" dur="indefinite" restart="never" nodeType="tmRoot"/>
+      </p:par>
+    </p:tnLst>
+  </p:timing>
 </p:sld>
 </file>
 
@@ -4884,215 +4674,21 @@
             <p:ph type="title"/>
           </p:nvPr>
         </p:nvSpPr>
-        <p:spPr/>
-        <p:txBody>
-          <a:bodyPr/>
-          <a:lstStyle/>
-          <a:p>
-            <a:r>
-              <a:rPr lang="da-DK" dirty="0" smtClean="0"/>
-              <a:t>The design</a:t>
-            </a:r>
-            <a:endParaRPr lang="da-DK" dirty="0"/>
-          </a:p>
-        </p:txBody>
-      </p:sp>
-      <p:sp>
-        <p:nvSpPr>
-          <p:cNvPr id="3" name="Pladsholder til indhold 2"/>
-          <p:cNvSpPr>
-            <a:spLocks noGrp="1"/>
-          </p:cNvSpPr>
-          <p:nvPr>
-            <p:ph idx="1"/>
-          </p:nvPr>
-        </p:nvSpPr>
-        <p:spPr/>
-        <p:txBody>
-          <a:bodyPr/>
-          <a:lstStyle/>
-          <a:p>
-            <a:r>
-              <a:rPr lang="da-DK" dirty="0" err="1" smtClean="0"/>
-              <a:t>Simplify</a:t>
-            </a:r>
-            <a:r>
-              <a:rPr lang="da-DK" dirty="0" smtClean="0"/>
-              <a:t>, </a:t>
-            </a:r>
-            <a:r>
-              <a:rPr lang="da-DK" dirty="0" err="1" smtClean="0"/>
-              <a:t>simplify</a:t>
-            </a:r>
-            <a:r>
-              <a:rPr lang="da-DK" dirty="0" smtClean="0"/>
-              <a:t>, </a:t>
-            </a:r>
-            <a:r>
-              <a:rPr lang="da-DK" dirty="0" err="1" smtClean="0"/>
-              <a:t>simplify</a:t>
-            </a:r>
-            <a:r>
-              <a:rPr lang="da-DK" dirty="0" smtClean="0"/>
-              <a:t> </a:t>
-            </a:r>
-            <a:r>
-              <a:rPr lang="da-DK" dirty="0" smtClean="0"/>
-              <a:t>(DSS fire, PCU)</a:t>
-            </a:r>
-          </a:p>
-          <a:p>
-            <a:pPr lvl="1"/>
-            <a:r>
-              <a:rPr lang="da-DK" dirty="0" err="1" smtClean="0"/>
-              <a:t>Lower</a:t>
-            </a:r>
-            <a:r>
-              <a:rPr lang="da-DK" dirty="0" smtClean="0"/>
-              <a:t> </a:t>
-            </a:r>
-            <a:r>
-              <a:rPr lang="da-DK" dirty="0" err="1" smtClean="0"/>
-              <a:t>risk</a:t>
-            </a:r>
-            <a:r>
-              <a:rPr lang="da-DK" dirty="0" smtClean="0"/>
-              <a:t>, faster, </a:t>
-            </a:r>
-            <a:r>
-              <a:rPr lang="da-DK" dirty="0" err="1" smtClean="0"/>
-              <a:t>replacable</a:t>
-            </a:r>
-            <a:r>
-              <a:rPr lang="da-DK" dirty="0" smtClean="0"/>
-              <a:t>, </a:t>
-            </a:r>
-            <a:r>
-              <a:rPr lang="da-DK" dirty="0" err="1" smtClean="0"/>
-              <a:t>reliable</a:t>
-            </a:r>
-            <a:endParaRPr lang="da-DK" dirty="0" smtClean="0"/>
-          </a:p>
-          <a:p>
-            <a:r>
-              <a:rPr lang="da-DK" dirty="0" smtClean="0"/>
-              <a:t>HW </a:t>
-            </a:r>
-            <a:r>
-              <a:rPr lang="da-DK" dirty="0" err="1" smtClean="0"/>
-              <a:t>safety</a:t>
-            </a:r>
-            <a:r>
-              <a:rPr lang="da-DK" dirty="0" smtClean="0"/>
-              <a:t> </a:t>
-            </a:r>
-            <a:r>
-              <a:rPr lang="da-DK" dirty="0" err="1" smtClean="0"/>
-              <a:t>with</a:t>
-            </a:r>
-            <a:r>
-              <a:rPr lang="da-DK" dirty="0" smtClean="0"/>
-              <a:t> </a:t>
-            </a:r>
-            <a:r>
-              <a:rPr lang="da-DK" dirty="0" err="1" smtClean="0"/>
-              <a:t>physically</a:t>
-            </a:r>
-            <a:r>
-              <a:rPr lang="da-DK" dirty="0" smtClean="0"/>
-              <a:t> </a:t>
-            </a:r>
-            <a:r>
-              <a:rPr lang="da-DK" dirty="0" err="1" smtClean="0"/>
-              <a:t>removable</a:t>
-            </a:r>
-            <a:r>
-              <a:rPr lang="da-DK" dirty="0" smtClean="0"/>
-              <a:t> pin</a:t>
-            </a:r>
-          </a:p>
-          <a:p>
-            <a:r>
-              <a:rPr lang="da-DK" dirty="0" err="1" smtClean="0"/>
-              <a:t>Experienced</a:t>
-            </a:r>
-            <a:r>
-              <a:rPr lang="da-DK" dirty="0" smtClean="0"/>
-              <a:t> </a:t>
-            </a:r>
-            <a:r>
-              <a:rPr lang="da-DK" dirty="0" err="1" smtClean="0"/>
-              <a:t>subcontractor</a:t>
-            </a:r>
-            <a:r>
-              <a:rPr lang="da-DK" dirty="0" smtClean="0"/>
-              <a:t> </a:t>
-            </a:r>
-            <a:r>
-              <a:rPr lang="da-DK" dirty="0" err="1" smtClean="0"/>
-              <a:t>with</a:t>
-            </a:r>
-            <a:r>
-              <a:rPr lang="da-DK" dirty="0" smtClean="0"/>
-              <a:t> clear </a:t>
-            </a:r>
-            <a:r>
-              <a:rPr lang="da-DK" dirty="0" err="1" smtClean="0"/>
-              <a:t>requirements</a:t>
-            </a:r>
-            <a:r>
-              <a:rPr lang="da-DK" dirty="0" smtClean="0"/>
-              <a:t> (standards)</a:t>
-            </a:r>
-          </a:p>
-          <a:p>
-            <a:r>
-              <a:rPr lang="da-DK" dirty="0" smtClean="0"/>
-              <a:t>Cold </a:t>
-            </a:r>
-            <a:r>
-              <a:rPr lang="da-DK" dirty="0" err="1" smtClean="0"/>
-              <a:t>restart</a:t>
-            </a:r>
-            <a:r>
-              <a:rPr lang="da-DK" dirty="0" smtClean="0"/>
-              <a:t> power </a:t>
-            </a:r>
-            <a:r>
-              <a:rPr lang="da-DK" dirty="0" err="1" smtClean="0"/>
-              <a:t>control</a:t>
-            </a:r>
-            <a:endParaRPr lang="da-DK" dirty="0" smtClean="0"/>
-          </a:p>
-          <a:p>
-            <a:r>
-              <a:rPr lang="da-DK" dirty="0" err="1" smtClean="0"/>
-              <a:t>Use</a:t>
-            </a:r>
-            <a:r>
-              <a:rPr lang="da-DK" dirty="0" smtClean="0"/>
-              <a:t> standards </a:t>
-            </a:r>
-            <a:r>
-              <a:rPr lang="da-DK" dirty="0" err="1" smtClean="0"/>
-              <a:t>where</a:t>
-            </a:r>
-            <a:r>
-              <a:rPr lang="da-DK" dirty="0" smtClean="0"/>
-              <a:t> </a:t>
-            </a:r>
-            <a:r>
-              <a:rPr lang="da-DK" dirty="0" err="1" smtClean="0"/>
-              <a:t>available</a:t>
-            </a:r>
-            <a:endParaRPr lang="da-DK" dirty="0" smtClean="0"/>
-          </a:p>
-          <a:p>
-            <a:r>
-              <a:rPr lang="da-DK" dirty="0" err="1" smtClean="0"/>
-              <a:t>SysML</a:t>
-            </a:r>
-            <a:endParaRPr lang="da-DK" dirty="0" smtClean="0"/>
+        <p:spPr>
+          <a:xfrm>
+            <a:off x="457200" y="-243408"/>
+            <a:ext cx="8229600" cy="1143000"/>
+          </a:xfrm>
+        </p:spPr>
+        <p:txBody>
+          <a:bodyPr/>
+          <a:lstStyle/>
+          <a:p>
+            <a:r>
+              <a:rPr lang="en-US" dirty="0" smtClean="0"/>
+              <a:t>Missile coverage</a:t>
+            </a:r>
+            <a:endParaRPr lang="en-US" dirty="0"/>
           </a:p>
         </p:txBody>
       </p:sp>
@@ -5119,11 +4715,50 @@
           </a:p>
         </p:txBody>
       </p:sp>
+      <p:pic>
+        <p:nvPicPr>
+          <p:cNvPr id="1026" name="Picture 2"/>
+          <p:cNvPicPr>
+            <a:picLocks noChangeAspect="1" noChangeArrowheads="1"/>
+          </p:cNvPicPr>
+          <p:nvPr/>
+        </p:nvPicPr>
+        <p:blipFill>
+          <a:blip r:embed="rId2" cstate="print"/>
+          <a:srcRect/>
+          <a:stretch>
+            <a:fillRect/>
+          </a:stretch>
+        </p:blipFill>
+        <p:spPr bwMode="auto">
+          <a:xfrm>
+            <a:off x="1691680" y="692696"/>
+            <a:ext cx="6070443" cy="5615533"/>
+          </a:xfrm>
+          <a:prstGeom prst="rect">
+            <a:avLst/>
+          </a:prstGeom>
+          <a:noFill/>
+          <a:ln w="9525">
+            <a:noFill/>
+            <a:miter lim="800000"/>
+            <a:headEnd/>
+            <a:tailEnd/>
+          </a:ln>
+        </p:spPr>
+      </p:pic>
     </p:spTree>
   </p:cSld>
   <p:clrMapOvr>
     <a:masterClrMapping/>
   </p:clrMapOvr>
+  <p:timing>
+    <p:tnLst>
+      <p:par>
+        <p:cTn id="1" dur="indefinite" restart="never" nodeType="tmRoot"/>
+      </p:par>
+    </p:tnLst>
+  </p:timing>
 </p:sld>
 </file>
 
@@ -5146,6 +4781,89 @@
       </p:grpSpPr>
       <p:sp>
         <p:nvSpPr>
+          <p:cNvPr id="2" name="Titel 1"/>
+          <p:cNvSpPr>
+            <a:spLocks noGrp="1"/>
+          </p:cNvSpPr>
+          <p:nvPr>
+            <p:ph type="title"/>
+          </p:nvPr>
+        </p:nvSpPr>
+        <p:spPr/>
+        <p:txBody>
+          <a:bodyPr/>
+          <a:lstStyle/>
+          <a:p>
+            <a:r>
+              <a:rPr lang="en-AU" smtClean="0"/>
+              <a:t>The design</a:t>
+            </a:r>
+            <a:endParaRPr lang="en-AU" dirty="0"/>
+          </a:p>
+        </p:txBody>
+      </p:sp>
+      <p:sp>
+        <p:nvSpPr>
+          <p:cNvPr id="3" name="Pladsholder til indhold 2"/>
+          <p:cNvSpPr>
+            <a:spLocks noGrp="1"/>
+          </p:cNvSpPr>
+          <p:nvPr>
+            <p:ph idx="1"/>
+          </p:nvPr>
+        </p:nvSpPr>
+        <p:spPr/>
+        <p:txBody>
+          <a:bodyPr/>
+          <a:lstStyle/>
+          <a:p>
+            <a:r>
+              <a:rPr lang="en-AU" smtClean="0"/>
+              <a:t>Simplify, simplify, simplify (DSS fire, PCU)</a:t>
+            </a:r>
+          </a:p>
+          <a:p>
+            <a:pPr lvl="1"/>
+            <a:r>
+              <a:rPr lang="en-AU" smtClean="0"/>
+              <a:t>Lower risk, faster, replacable, reliable</a:t>
+            </a:r>
+          </a:p>
+          <a:p>
+            <a:r>
+              <a:rPr lang="en-AU" smtClean="0"/>
+              <a:t>HW safety with physicaly removable pin</a:t>
+            </a:r>
+          </a:p>
+          <a:p>
+            <a:r>
+              <a:rPr lang="en-AU" smtClean="0"/>
+              <a:t>Experienced subcontractor with clear requirements (standards)</a:t>
+            </a:r>
+          </a:p>
+          <a:p>
+            <a:r>
+              <a:rPr lang="en-AU" smtClean="0"/>
+              <a:t>Cold restart power control</a:t>
+            </a:r>
+          </a:p>
+          <a:p>
+            <a:r>
+              <a:rPr lang="en-AU" smtClean="0"/>
+              <a:t>Use standards where available</a:t>
+            </a:r>
+          </a:p>
+          <a:p>
+            <a:r>
+              <a:rPr lang="en-AU" smtClean="0"/>
+              <a:t>SysML</a:t>
+            </a:r>
+            <a:endParaRPr lang="en-AU" dirty="0" smtClean="0"/>
+          </a:p>
+        </p:txBody>
+      </p:sp>
+      <p:sp>
+        <p:nvSpPr>
           <p:cNvPr id="4" name="Pladsholder til sidefod 3"/>
           <p:cNvSpPr>
             <a:spLocks noGrp="1"/>
@@ -5160,10 +4878,65 @@
           <a:lstStyle/>
           <a:p>
             <a:r>
-              <a:rPr lang="da-DK" smtClean="0"/>
+              <a:rPr lang="en-AU" smtClean="0"/>
               <a:t>Company F</a:t>
             </a:r>
-            <a:endParaRPr lang="da-DK"/>
+            <a:endParaRPr lang="en-AU"/>
+          </a:p>
+        </p:txBody>
+      </p:sp>
+    </p:spTree>
+  </p:cSld>
+  <p:clrMapOvr>
+    <a:masterClrMapping/>
+  </p:clrMapOvr>
+  <p:timing>
+    <p:tnLst>
+      <p:par>
+        <p:cTn id="1" dur="indefinite" restart="never" nodeType="tmRoot"/>
+      </p:par>
+    </p:tnLst>
+  </p:timing>
+</p:sld>
+</file>
+
+<file path=ppt/slides/slide9.xml><?xml version="1.0" encoding="utf-8"?>
+<p:sld xmlns:a="http://schemas.openxmlformats.org/drawingml/2006/main" xmlns:r="http://schemas.openxmlformats.org/officeDocument/2006/relationships" xmlns:p="http://schemas.openxmlformats.org/presentationml/2006/main">
+  <p:cSld>
+    <p:spTree>
+      <p:nvGrpSpPr>
+        <p:cNvPr id="1" name=""/>
+        <p:cNvGrpSpPr/>
+        <p:nvPr/>
+      </p:nvGrpSpPr>
+      <p:grpSpPr>
+        <a:xfrm>
+          <a:off x="0" y="0"/>
+          <a:ext cx="0" cy="0"/>
+          <a:chOff x="0" y="0"/>
+          <a:chExt cx="0" cy="0"/>
+        </a:xfrm>
+      </p:grpSpPr>
+      <p:sp>
+        <p:nvSpPr>
+          <p:cNvPr id="4" name="Pladsholder til sidefod 3"/>
+          <p:cNvSpPr>
+            <a:spLocks noGrp="1"/>
+          </p:cNvSpPr>
+          <p:nvPr>
+            <p:ph type="ftr" sz="quarter" idx="11"/>
+          </p:nvPr>
+        </p:nvSpPr>
+        <p:spPr/>
+        <p:txBody>
+          <a:bodyPr/>
+          <a:lstStyle/>
+          <a:p>
+            <a:r>
+              <a:rPr lang="en-AU" smtClean="0"/>
+              <a:t>Company F</a:t>
+            </a:r>
+            <a:endParaRPr lang="en-AU"/>
           </a:p>
         </p:txBody>
       </p:sp>
@@ -5177,8 +4950,8 @@
         </p:nvSpPr>
         <p:spPr bwMode="auto">
           <a:xfrm>
-            <a:off x="0" y="0"/>
-            <a:ext cx="9144000" cy="0"/>
+            <a:off x="0" y="-184666"/>
+            <a:ext cx="184731" cy="369332"/>
           </a:xfrm>
           <a:prstGeom prst="rect">
             <a:avLst/>
@@ -5201,7 +4974,7 @@
           </a:bodyPr>
           <a:lstStyle/>
           <a:p>
-            <a:endParaRPr lang="da-DK"/>
+            <a:endParaRPr lang="en-AU"/>
           </a:p>
         </p:txBody>
       </p:sp>
@@ -5242,320 +5015,13 @@
   <p:clrMapOvr>
     <a:masterClrMapping/>
   </p:clrMapOvr>
-</p:sld>
-</file>
-
-<file path=ppt/slides/slide9.xml><?xml version="1.0" encoding="utf-8"?>
-<p:sld xmlns:a="http://schemas.openxmlformats.org/drawingml/2006/main" xmlns:r="http://schemas.openxmlformats.org/officeDocument/2006/relationships" xmlns:p="http://schemas.openxmlformats.org/presentationml/2006/main">
-  <p:cSld>
-    <p:spTree>
-      <p:nvGrpSpPr>
-        <p:cNvPr id="1" name=""/>
-        <p:cNvGrpSpPr/>
-        <p:nvPr/>
-      </p:nvGrpSpPr>
-      <p:grpSpPr>
-        <a:xfrm>
-          <a:off x="0" y="0"/>
-          <a:ext cx="0" cy="0"/>
-          <a:chOff x="0" y="0"/>
-          <a:chExt cx="0" cy="0"/>
-        </a:xfrm>
-      </p:grpSpPr>
-      <p:sp>
-        <p:nvSpPr>
-          <p:cNvPr id="2" name="Titel 1"/>
-          <p:cNvSpPr>
-            <a:spLocks noGrp="1"/>
-          </p:cNvSpPr>
-          <p:nvPr>
-            <p:ph type="title"/>
-          </p:nvPr>
-        </p:nvSpPr>
-        <p:spPr/>
-        <p:txBody>
-          <a:bodyPr/>
-          <a:lstStyle/>
-          <a:p>
-            <a:r>
-              <a:rPr lang="da-DK" dirty="0" smtClean="0"/>
-              <a:t>The </a:t>
-            </a:r>
-            <a:r>
-              <a:rPr lang="da-DK" dirty="0" err="1" smtClean="0"/>
-              <a:t>process</a:t>
-            </a:r>
-            <a:endParaRPr lang="da-DK" dirty="0"/>
-          </a:p>
-        </p:txBody>
-      </p:sp>
-      <p:sp>
-        <p:nvSpPr>
-          <p:cNvPr id="3" name="Pladsholder til indhold 2"/>
-          <p:cNvSpPr>
-            <a:spLocks noGrp="1"/>
-          </p:cNvSpPr>
-          <p:nvPr>
-            <p:ph idx="1"/>
-          </p:nvPr>
-        </p:nvSpPr>
-        <p:spPr/>
-        <p:txBody>
-          <a:bodyPr/>
-          <a:lstStyle/>
-          <a:p>
-            <a:r>
-              <a:rPr lang="da-DK" dirty="0" err="1" smtClean="0"/>
-              <a:t>We</a:t>
-            </a:r>
-            <a:r>
-              <a:rPr lang="da-DK" dirty="0" smtClean="0"/>
-              <a:t> at Company F </a:t>
-            </a:r>
-            <a:r>
-              <a:rPr lang="da-DK" dirty="0" err="1" smtClean="0"/>
-              <a:t>believes</a:t>
-            </a:r>
-            <a:r>
-              <a:rPr lang="da-DK" dirty="0" smtClean="0"/>
-              <a:t> in </a:t>
-            </a:r>
-            <a:r>
-              <a:rPr lang="da-DK" dirty="0" err="1" smtClean="0"/>
-              <a:t>employing</a:t>
-            </a:r>
-            <a:r>
-              <a:rPr lang="da-DK" dirty="0" smtClean="0"/>
-              <a:t> the </a:t>
-            </a:r>
-            <a:r>
-              <a:rPr lang="da-DK" dirty="0" err="1" smtClean="0"/>
-              <a:t>best</a:t>
-            </a:r>
-            <a:r>
-              <a:rPr lang="da-DK" dirty="0" smtClean="0"/>
-              <a:t>, and </a:t>
-            </a:r>
-            <a:r>
-              <a:rPr lang="da-DK" dirty="0" err="1" smtClean="0"/>
-              <a:t>when</a:t>
-            </a:r>
-            <a:r>
-              <a:rPr lang="da-DK" dirty="0" smtClean="0"/>
-              <a:t> the </a:t>
-            </a:r>
-            <a:r>
-              <a:rPr lang="da-DK" dirty="0" err="1" smtClean="0"/>
-              <a:t>best</a:t>
-            </a:r>
-            <a:r>
-              <a:rPr lang="da-DK" dirty="0" smtClean="0"/>
-              <a:t> </a:t>
-            </a:r>
-            <a:r>
-              <a:rPr lang="da-DK" dirty="0" err="1" smtClean="0"/>
-              <a:t>won’t</a:t>
-            </a:r>
-            <a:r>
-              <a:rPr lang="da-DK" dirty="0" smtClean="0"/>
-              <a:t> </a:t>
-            </a:r>
-            <a:r>
-              <a:rPr lang="da-DK" dirty="0" err="1" smtClean="0"/>
-              <a:t>come</a:t>
-            </a:r>
-            <a:r>
-              <a:rPr lang="da-DK" dirty="0" smtClean="0"/>
-              <a:t> to </a:t>
-            </a:r>
-            <a:r>
-              <a:rPr lang="da-DK" dirty="0" err="1" smtClean="0"/>
-              <a:t>you</a:t>
-            </a:r>
-            <a:r>
-              <a:rPr lang="da-DK" dirty="0" smtClean="0"/>
-              <a:t>, </a:t>
-            </a:r>
-            <a:r>
-              <a:rPr lang="da-DK" dirty="0" err="1" smtClean="0"/>
-              <a:t>you</a:t>
-            </a:r>
-            <a:r>
-              <a:rPr lang="da-DK" dirty="0" smtClean="0"/>
-              <a:t> must </a:t>
-            </a:r>
-            <a:r>
-              <a:rPr lang="da-DK" dirty="0" err="1" smtClean="0"/>
-              <a:t>come</a:t>
-            </a:r>
-            <a:r>
-              <a:rPr lang="da-DK" dirty="0" smtClean="0"/>
-              <a:t> to the </a:t>
-            </a:r>
-            <a:r>
-              <a:rPr lang="da-DK" dirty="0" err="1" smtClean="0"/>
-              <a:t>best</a:t>
-            </a:r>
-            <a:r>
-              <a:rPr lang="da-DK" dirty="0" smtClean="0"/>
-              <a:t>.</a:t>
-            </a:r>
-          </a:p>
-          <a:p>
-            <a:pPr lvl="1"/>
-            <a:r>
-              <a:rPr lang="da-DK" dirty="0" err="1" smtClean="0"/>
-              <a:t>Geographically</a:t>
-            </a:r>
-            <a:r>
-              <a:rPr lang="da-DK" dirty="0" smtClean="0"/>
-              <a:t> </a:t>
-            </a:r>
-            <a:r>
-              <a:rPr lang="da-DK" dirty="0" err="1" smtClean="0"/>
-              <a:t>distributed</a:t>
-            </a:r>
-            <a:r>
-              <a:rPr lang="da-DK" dirty="0" smtClean="0"/>
-              <a:t> </a:t>
-            </a:r>
-            <a:r>
-              <a:rPr lang="da-DK" dirty="0" err="1" smtClean="0"/>
-              <a:t>developement</a:t>
-            </a:r>
-            <a:r>
-              <a:rPr lang="da-DK" dirty="0" smtClean="0"/>
-              <a:t>.</a:t>
-            </a:r>
-          </a:p>
-          <a:p>
-            <a:pPr lvl="1"/>
-            <a:r>
-              <a:rPr lang="da-DK" dirty="0" err="1" smtClean="0"/>
-              <a:t>Google</a:t>
-            </a:r>
-            <a:r>
-              <a:rPr lang="da-DK" dirty="0" smtClean="0"/>
-              <a:t> </a:t>
-            </a:r>
-            <a:r>
-              <a:rPr lang="da-DK" dirty="0" err="1" smtClean="0"/>
-              <a:t>code</a:t>
-            </a:r>
-            <a:r>
-              <a:rPr lang="da-DK" dirty="0" smtClean="0"/>
-              <a:t>, </a:t>
-            </a:r>
-            <a:r>
-              <a:rPr lang="da-DK" dirty="0" err="1" smtClean="0"/>
-              <a:t>Wiki</a:t>
-            </a:r>
-            <a:r>
-              <a:rPr lang="da-DK" dirty="0" smtClean="0"/>
-              <a:t>, </a:t>
-            </a:r>
-            <a:r>
-              <a:rPr lang="da-DK" dirty="0" err="1" smtClean="0"/>
-              <a:t>Subversion</a:t>
-            </a:r>
-            <a:r>
-              <a:rPr lang="da-DK" dirty="0" smtClean="0"/>
-              <a:t>, meetings and </a:t>
-            </a:r>
-            <a:r>
-              <a:rPr lang="da-DK" dirty="0" err="1" smtClean="0"/>
-              <a:t>late</a:t>
-            </a:r>
-            <a:r>
-              <a:rPr lang="da-DK" dirty="0" smtClean="0"/>
-              <a:t> </a:t>
-            </a:r>
-            <a:r>
-              <a:rPr lang="da-DK" dirty="0" err="1" smtClean="0"/>
-              <a:t>nights</a:t>
-            </a:r>
-            <a:r>
-              <a:rPr lang="da-DK" dirty="0" smtClean="0"/>
-              <a:t>.</a:t>
-            </a:r>
-          </a:p>
-          <a:p>
-            <a:pPr lvl="1"/>
-            <a:r>
-              <a:rPr lang="da-DK" dirty="0" err="1" smtClean="0"/>
-              <a:t>Internal</a:t>
-            </a:r>
-            <a:r>
-              <a:rPr lang="da-DK" dirty="0" smtClean="0"/>
-              <a:t> </a:t>
-            </a:r>
-            <a:r>
-              <a:rPr lang="da-DK" dirty="0" err="1" smtClean="0"/>
-              <a:t>reviews</a:t>
-            </a:r>
-            <a:r>
-              <a:rPr lang="da-DK" dirty="0" smtClean="0"/>
-              <a:t>.</a:t>
-            </a:r>
-            <a:endParaRPr lang="da-DK" dirty="0" smtClean="0"/>
-          </a:p>
-          <a:p>
-            <a:pPr lvl="1"/>
-            <a:r>
-              <a:rPr lang="da-DK" dirty="0" smtClean="0"/>
-              <a:t>Building the </a:t>
-            </a:r>
-            <a:r>
-              <a:rPr lang="da-DK" dirty="0" err="1" smtClean="0"/>
-              <a:t>unknown</a:t>
-            </a:r>
-            <a:r>
-              <a:rPr lang="da-DK" dirty="0" smtClean="0"/>
-              <a:t> </a:t>
-            </a:r>
-            <a:r>
-              <a:rPr lang="da-DK" dirty="0" smtClean="0"/>
-              <a:t>in 32 </a:t>
-            </a:r>
-            <a:r>
-              <a:rPr lang="da-DK" dirty="0" err="1" smtClean="0"/>
-              <a:t>hours</a:t>
-            </a:r>
-            <a:r>
-              <a:rPr lang="da-DK" dirty="0" smtClean="0"/>
-              <a:t>.</a:t>
-            </a:r>
-          </a:p>
-        </p:txBody>
-      </p:sp>
-      <p:sp>
-        <p:nvSpPr>
-          <p:cNvPr id="4" name="Pladsholder til sidefod 3"/>
-          <p:cNvSpPr>
-            <a:spLocks noGrp="1"/>
-          </p:cNvSpPr>
-          <p:nvPr>
-            <p:ph type="ftr" sz="quarter" idx="11"/>
-          </p:nvPr>
-        </p:nvSpPr>
-        <p:spPr/>
-        <p:txBody>
-          <a:bodyPr/>
-          <a:lstStyle/>
-          <a:p>
-            <a:r>
-              <a:rPr lang="da-DK" smtClean="0"/>
-              <a:t>Company F</a:t>
-            </a:r>
-            <a:endParaRPr lang="da-DK"/>
-          </a:p>
-        </p:txBody>
-      </p:sp>
-    </p:spTree>
-  </p:cSld>
-  <p:clrMapOvr>
-    <a:masterClrMapping/>
-  </p:clrMapOvr>
+  <p:timing>
+    <p:tnLst>
+      <p:par>
+        <p:cTn id="1" dur="indefinite" restart="never" nodeType="tmRoot"/>
+      </p:par>
+    </p:tnLst>
+  </p:timing>
 </p:sld>
 </file>
 

</xml_diff>

<commit_message>
Adding missing comment to presentation
</commit_message>
<xml_diff>
--- a/presentation/presentation.pptx
+++ b/presentation/presentation.pptx
@@ -3655,15 +3655,7 @@
           <a:p>
             <a:r>
               <a:rPr lang="en-AU" dirty="0" smtClean="0"/>
-              <a:t>We at Company F believe in employing the best, and when the best won’t come to you, you must </a:t>
-            </a:r>
-            <a:r>
-              <a:rPr lang="en-AU" dirty="0" smtClean="0"/>
-              <a:t>go</a:t>
-            </a:r>
-            <a:r>
-              <a:rPr lang="en-AU" dirty="0" smtClean="0"/>
-              <a:t> to the best.</a:t>
+              <a:t>We at Company F believe in employing the best, and when the best won’t come to you, you must go to the best.</a:t>
             </a:r>
           </a:p>
           <a:p>
@@ -3693,7 +3685,6 @@
               <a:rPr lang="en-AU" dirty="0" smtClean="0"/>
               <a:t>Building the unknown in 32 hours.</a:t>
             </a:r>
-            <a:endParaRPr lang="en-AU" dirty="0" smtClean="0"/>
           </a:p>
         </p:txBody>
       </p:sp>
@@ -4076,7 +4067,6 @@
               <a:rPr lang="en-AU" sz="3200" dirty="0" smtClean="0"/>
               <a:t>  - Company F Self protection suite for F-16</a:t>
             </a:r>
-            <a:endParaRPr lang="en-AU" sz="3200" dirty="0" smtClean="0"/>
           </a:p>
         </p:txBody>
       </p:sp>
@@ -4605,7 +4595,6 @@
               <a:rPr lang="en-AU" dirty="0" smtClean="0"/>
               <a:t>High detail level in system requirements (missile coverage, response pattern, power and weight, pin layout, …)</a:t>
             </a:r>
-            <a:endParaRPr lang="en-AU" dirty="0" smtClean="0"/>
           </a:p>
         </p:txBody>
       </p:sp>
@@ -4676,17 +4665,23 @@
         </p:nvSpPr>
         <p:spPr>
           <a:xfrm>
-            <a:off x="457200" y="-243408"/>
-            <a:ext cx="8229600" cy="1143000"/>
+            <a:off x="251520" y="-243408"/>
+            <a:ext cx="8640960" cy="1143000"/>
           </a:xfrm>
         </p:spPr>
         <p:txBody>
-          <a:bodyPr/>
+          <a:bodyPr>
+            <a:normAutofit/>
+          </a:bodyPr>
           <a:lstStyle/>
           <a:p>
             <a:r>
               <a:rPr lang="en-US" dirty="0" smtClean="0"/>
-              <a:t>Missile coverage</a:t>
+              <a:t>Missile </a:t>
+            </a:r>
+            <a:r>
+              <a:rPr lang="en-US" dirty="0" smtClean="0"/>
+              <a:t>coverage – one or two PODs?</a:t>
             </a:r>
             <a:endParaRPr lang="en-US" dirty="0"/>
           </a:p>

</xml_diff>

<commit_message>
Updating with extra drawings at the end
</commit_message>
<xml_diff>
--- a/presentation/presentation.pptx
+++ b/presentation/presentation.pptx
@@ -5,7 +5,7 @@
     <p:sldMasterId id="2147483648" r:id="rId1"/>
   </p:sldMasterIdLst>
   <p:notesMasterIdLst>
-    <p:notesMasterId r:id="rId13"/>
+    <p:notesMasterId r:id="rId15"/>
   </p:notesMasterIdLst>
   <p:sldIdLst>
     <p:sldId id="256" r:id="rId2"/>
@@ -19,6 +19,8 @@
     <p:sldId id="266" r:id="rId10"/>
     <p:sldId id="267" r:id="rId11"/>
     <p:sldId id="268" r:id="rId12"/>
+    <p:sldId id="270" r:id="rId13"/>
+    <p:sldId id="271" r:id="rId14"/>
   </p:sldIdLst>
   <p:sldSz cx="9144000" cy="6858000" type="screen4x3"/>
   <p:notesSz cx="6858000" cy="9144000"/>
@@ -3830,6 +3832,166 @@
 </p:sld>
 </file>
 
+<file path=ppt/slides/slide12.xml><?xml version="1.0" encoding="utf-8"?>
+<p:sld xmlns:a="http://schemas.openxmlformats.org/drawingml/2006/main" xmlns:r="http://schemas.openxmlformats.org/officeDocument/2006/relationships" xmlns:p="http://schemas.openxmlformats.org/presentationml/2006/main">
+  <p:cSld>
+    <p:spTree>
+      <p:nvGrpSpPr>
+        <p:cNvPr id="1" name=""/>
+        <p:cNvGrpSpPr/>
+        <p:nvPr/>
+      </p:nvGrpSpPr>
+      <p:grpSpPr>
+        <a:xfrm>
+          <a:off x="0" y="0"/>
+          <a:ext cx="0" cy="0"/>
+          <a:chOff x="0" y="0"/>
+          <a:chExt cx="0" cy="0"/>
+        </a:xfrm>
+      </p:grpSpPr>
+      <p:sp>
+        <p:nvSpPr>
+          <p:cNvPr id="4" name="Pladsholder til sidefod 3"/>
+          <p:cNvSpPr>
+            <a:spLocks noGrp="1"/>
+          </p:cNvSpPr>
+          <p:nvPr>
+            <p:ph type="ftr" sz="quarter" idx="11"/>
+          </p:nvPr>
+        </p:nvSpPr>
+        <p:spPr/>
+        <p:txBody>
+          <a:bodyPr/>
+          <a:lstStyle/>
+          <a:p>
+            <a:r>
+              <a:rPr lang="da-DK" smtClean="0"/>
+              <a:t>Company F</a:t>
+            </a:r>
+            <a:endParaRPr lang="da-DK"/>
+          </a:p>
+        </p:txBody>
+      </p:sp>
+      <p:pic>
+        <p:nvPicPr>
+          <p:cNvPr id="1026" name="Picture 2"/>
+          <p:cNvPicPr>
+            <a:picLocks noChangeAspect="1" noChangeArrowheads="1"/>
+          </p:cNvPicPr>
+          <p:nvPr/>
+        </p:nvPicPr>
+        <p:blipFill>
+          <a:blip r:embed="rId2" cstate="print"/>
+          <a:srcRect/>
+          <a:stretch>
+            <a:fillRect/>
+          </a:stretch>
+        </p:blipFill>
+        <p:spPr bwMode="auto">
+          <a:xfrm>
+            <a:off x="539551" y="44624"/>
+            <a:ext cx="7923659" cy="6370734"/>
+          </a:xfrm>
+          <a:prstGeom prst="rect">
+            <a:avLst/>
+          </a:prstGeom>
+          <a:noFill/>
+          <a:ln w="9525">
+            <a:noFill/>
+            <a:miter lim="800000"/>
+            <a:headEnd/>
+            <a:tailEnd/>
+          </a:ln>
+        </p:spPr>
+      </p:pic>
+    </p:spTree>
+  </p:cSld>
+  <p:clrMapOvr>
+    <a:masterClrMapping/>
+  </p:clrMapOvr>
+</p:sld>
+</file>
+
+<file path=ppt/slides/slide13.xml><?xml version="1.0" encoding="utf-8"?>
+<p:sld xmlns:a="http://schemas.openxmlformats.org/drawingml/2006/main" xmlns:r="http://schemas.openxmlformats.org/officeDocument/2006/relationships" xmlns:p="http://schemas.openxmlformats.org/presentationml/2006/main">
+  <p:cSld>
+    <p:spTree>
+      <p:nvGrpSpPr>
+        <p:cNvPr id="1" name=""/>
+        <p:cNvGrpSpPr/>
+        <p:nvPr/>
+      </p:nvGrpSpPr>
+      <p:grpSpPr>
+        <a:xfrm>
+          <a:off x="0" y="0"/>
+          <a:ext cx="0" cy="0"/>
+          <a:chOff x="0" y="0"/>
+          <a:chExt cx="0" cy="0"/>
+        </a:xfrm>
+      </p:grpSpPr>
+      <p:sp>
+        <p:nvSpPr>
+          <p:cNvPr id="4" name="Pladsholder til sidefod 3"/>
+          <p:cNvSpPr>
+            <a:spLocks noGrp="1"/>
+          </p:cNvSpPr>
+          <p:nvPr>
+            <p:ph type="ftr" sz="quarter" idx="11"/>
+          </p:nvPr>
+        </p:nvSpPr>
+        <p:spPr/>
+        <p:txBody>
+          <a:bodyPr/>
+          <a:lstStyle/>
+          <a:p>
+            <a:r>
+              <a:rPr lang="da-DK" smtClean="0"/>
+              <a:t>Company F</a:t>
+            </a:r>
+            <a:endParaRPr lang="da-DK"/>
+          </a:p>
+        </p:txBody>
+      </p:sp>
+      <p:pic>
+        <p:nvPicPr>
+          <p:cNvPr id="2050" name="Picture 2"/>
+          <p:cNvPicPr>
+            <a:picLocks noChangeAspect="1" noChangeArrowheads="1"/>
+          </p:cNvPicPr>
+          <p:nvPr/>
+        </p:nvPicPr>
+        <p:blipFill>
+          <a:blip r:embed="rId2" cstate="print"/>
+          <a:srcRect/>
+          <a:stretch>
+            <a:fillRect/>
+          </a:stretch>
+        </p:blipFill>
+        <p:spPr bwMode="auto">
+          <a:xfrm>
+            <a:off x="0" y="44624"/>
+            <a:ext cx="9144000" cy="6353175"/>
+          </a:xfrm>
+          <a:prstGeom prst="rect">
+            <a:avLst/>
+          </a:prstGeom>
+          <a:noFill/>
+          <a:ln w="9525">
+            <a:noFill/>
+            <a:miter lim="800000"/>
+            <a:headEnd/>
+            <a:tailEnd/>
+          </a:ln>
+        </p:spPr>
+      </p:pic>
+    </p:spTree>
+  </p:cSld>
+  <p:clrMapOvr>
+    <a:masterClrMapping/>
+  </p:clrMapOvr>
+</p:sld>
+</file>
+
 <file path=ppt/slides/slide2.xml><?xml version="1.0" encoding="utf-8"?>
 <p:sld xmlns:a="http://schemas.openxmlformats.org/drawingml/2006/main" xmlns:r="http://schemas.openxmlformats.org/officeDocument/2006/relationships" xmlns:p="http://schemas.openxmlformats.org/presentationml/2006/main">
   <p:cSld>
@@ -4677,11 +4839,7 @@
           <a:p>
             <a:r>
               <a:rPr lang="en-US" dirty="0" smtClean="0"/>
-              <a:t>Missile </a:t>
-            </a:r>
-            <a:r>
-              <a:rPr lang="en-US" dirty="0" smtClean="0"/>
-              <a:t>coverage – one or two PODs?</a:t>
+              <a:t>Missile coverage – one or two PODs?</a:t>
             </a:r>
             <a:endParaRPr lang="en-US" dirty="0"/>
           </a:p>

</xml_diff>